<commit_message>
added reseach overview, analysed projects
</commit_message>
<xml_diff>
--- a/presentation.pptx
+++ b/presentation.pptx
@@ -204,7 +204,7 @@
             <a:fld id="{A3A83680-2C14-4C76-A81E-024FE6567D95}" type="datetimeFigureOut">
               <a:rPr lang="en-US" smtClean="0"/>
               <a:pPr/>
-              <a:t>3/2/15</a:t>
+              <a:t>15-03-02</a:t>
             </a:fld>
             <a:endParaRPr lang="en-US"/>
           </a:p>
@@ -855,7 +855,7 @@
             <a:fld id="{B04B26F6-2EC0-48CC-9564-7C3151355A53}" type="datetime1">
               <a:rPr lang="en-US" smtClean="0"/>
               <a:pPr/>
-              <a:t>3/2/15</a:t>
+              <a:t>15-03-02</a:t>
             </a:fld>
             <a:endParaRPr lang="en-US"/>
           </a:p>
@@ -1022,7 +1022,7 @@
             <a:fld id="{46AE693F-1EDB-4E9B-A372-75EBAC486C4C}" type="datetime1">
               <a:rPr lang="en-US" smtClean="0"/>
               <a:pPr/>
-              <a:t>3/2/15</a:t>
+              <a:t>15-03-02</a:t>
             </a:fld>
             <a:endParaRPr lang="en-US"/>
           </a:p>
@@ -1199,7 +1199,7 @@
             <a:fld id="{D7707EE7-8B9F-4F64-AB41-F607E71FAD9D}" type="datetime1">
               <a:rPr lang="en-US" smtClean="0"/>
               <a:pPr/>
-              <a:t>3/2/15</a:t>
+              <a:t>15-03-02</a:t>
             </a:fld>
             <a:endParaRPr lang="en-US"/>
           </a:p>
@@ -1366,7 +1366,7 @@
             <a:fld id="{24B568E6-F02F-4640-8CA7-DD2B1CDAF58B}" type="datetime1">
               <a:rPr lang="en-US" smtClean="0"/>
               <a:pPr/>
-              <a:t>3/2/15</a:t>
+              <a:t>15-03-02</a:t>
             </a:fld>
             <a:endParaRPr lang="en-US"/>
           </a:p>
@@ -1609,7 +1609,7 @@
             <a:fld id="{A121E7AB-71A9-4F53-B5E9-C40E8AF6F07E}" type="datetime1">
               <a:rPr lang="en-US" smtClean="0"/>
               <a:pPr/>
-              <a:t>3/2/15</a:t>
+              <a:t>15-03-02</a:t>
             </a:fld>
             <a:endParaRPr lang="en-US"/>
           </a:p>
@@ -1894,7 +1894,7 @@
             <a:fld id="{ED0EEFA4-16F8-44A0-A455-D75FA9676508}" type="datetime1">
               <a:rPr lang="en-US" smtClean="0"/>
               <a:pPr/>
-              <a:t>3/2/15</a:t>
+              <a:t>15-03-02</a:t>
             </a:fld>
             <a:endParaRPr lang="en-US"/>
           </a:p>
@@ -2313,7 +2313,7 @@
             <a:fld id="{7309DE74-458B-4027-A1B9-A0A919D2E759}" type="datetime1">
               <a:rPr lang="en-US" smtClean="0"/>
               <a:pPr/>
-              <a:t>3/2/15</a:t>
+              <a:t>15-03-02</a:t>
             </a:fld>
             <a:endParaRPr lang="en-US"/>
           </a:p>
@@ -2428,7 +2428,7 @@
             <a:fld id="{4997B861-8699-46EF-A281-77869D1CCC62}" type="datetime1">
               <a:rPr lang="en-US" smtClean="0"/>
               <a:pPr/>
-              <a:t>3/2/15</a:t>
+              <a:t>15-03-02</a:t>
             </a:fld>
             <a:endParaRPr lang="en-US"/>
           </a:p>
@@ -2520,7 +2520,7 @@
             <a:fld id="{D45435D9-7F9E-470D-B40F-9ECF253826E2}" type="datetime1">
               <a:rPr lang="en-US" smtClean="0"/>
               <a:pPr/>
-              <a:t>3/2/15</a:t>
+              <a:t>15-03-02</a:t>
             </a:fld>
             <a:endParaRPr lang="en-US"/>
           </a:p>
@@ -2794,7 +2794,7 @@
             <a:fld id="{BCF807F3-50E1-49A6-9810-311E7547B47D}" type="datetime1">
               <a:rPr lang="en-US" smtClean="0"/>
               <a:pPr/>
-              <a:t>3/2/15</a:t>
+              <a:t>15-03-02</a:t>
             </a:fld>
             <a:endParaRPr lang="en-US"/>
           </a:p>
@@ -3044,7 +3044,7 @@
             <a:fld id="{3241E4AC-654B-44E5-8A53-D925CD7B043C}" type="datetime1">
               <a:rPr lang="en-US" smtClean="0"/>
               <a:pPr/>
-              <a:t>3/2/15</a:t>
+              <a:t>15-03-02</a:t>
             </a:fld>
             <a:endParaRPr lang="en-US"/>
           </a:p>
@@ -3254,7 +3254,7 @@
             <a:fld id="{E1ED303D-2AF7-4EBB-943A-20D78C0D5FED}" type="datetime1">
               <a:rPr lang="en-US" smtClean="0"/>
               <a:pPr/>
-              <a:t>3/2/15</a:t>
+              <a:t>15-03-02</a:t>
             </a:fld>
             <a:endParaRPr lang="en-US"/>
           </a:p>
@@ -3835,7 +3835,6 @@
               <a:rPr lang="en-US" sz="3200" b="1" dirty="0" smtClean="0"/>
               <a:t> </a:t>
             </a:r>
-            <a:endParaRPr lang="en-US" sz="3200" b="1" dirty="0" smtClean="0"/>
           </a:p>
           <a:p>
             <a:endParaRPr lang="en-US" dirty="0"/>
@@ -4901,6 +4900,36 @@
           </a:p>
         </p:txBody>
       </p:sp>
+      <p:pic>
+        <p:nvPicPr>
+          <p:cNvPr id="5" name="Picture 4" descr="Screenshot 2015-03-02 20.31.50.png"/>
+          <p:cNvPicPr>
+            <a:picLocks noChangeAspect="1"/>
+          </p:cNvPicPr>
+          <p:nvPr/>
+        </p:nvPicPr>
+        <p:blipFill>
+          <a:blip r:embed="rId3">
+            <a:extLst>
+              <a:ext uri="{28A0092B-C50C-407E-A947-70E740481C1C}">
+                <a14:useLocalDpi xmlns:a14="http://schemas.microsoft.com/office/drawing/2010/main" val="0"/>
+              </a:ext>
+            </a:extLst>
+          </a:blip>
+          <a:stretch>
+            <a:fillRect/>
+          </a:stretch>
+        </p:blipFill>
+        <p:spPr>
+          <a:xfrm>
+            <a:off x="838200" y="3035300"/>
+            <a:ext cx="11023600" cy="1841500"/>
+          </a:xfrm>
+          <a:prstGeom prst="rect">
+            <a:avLst/>
+          </a:prstGeom>
+        </p:spPr>
+      </p:pic>
     </p:spTree>
   </p:cSld>
   <p:clrMapOvr>
@@ -5041,7 +5070,6 @@
               <a:rPr lang="en-CA" sz="4600" b="1" dirty="0" smtClean="0"/>
               <a:t>compiled languages?</a:t>
             </a:r>
-            <a:endParaRPr lang="en-CA" sz="4600" b="1" dirty="0" smtClean="0"/>
           </a:p>
           <a:p>
             <a:endParaRPr lang="en-CA" sz="4600" b="1" dirty="0" smtClean="0"/>

</xml_diff>

<commit_message>
Reorder slides and add minning repositories slide
</commit_message>
<xml_diff>
--- a/presentation.pptx
+++ b/presentation.pptx
@@ -12,13 +12,13 @@
     <p:sldId id="257" r:id="rId3"/>
     <p:sldId id="267" r:id="rId4"/>
     <p:sldId id="258" r:id="rId5"/>
-    <p:sldId id="264" r:id="rId6"/>
-    <p:sldId id="278" r:id="rId7"/>
-    <p:sldId id="279" r:id="rId8"/>
-    <p:sldId id="260" r:id="rId9"/>
-    <p:sldId id="269" r:id="rId10"/>
-    <p:sldId id="268" r:id="rId11"/>
-    <p:sldId id="277" r:id="rId12"/>
+    <p:sldId id="260" r:id="rId6"/>
+    <p:sldId id="264" r:id="rId7"/>
+    <p:sldId id="281" r:id="rId8"/>
+    <p:sldId id="278" r:id="rId9"/>
+    <p:sldId id="280" r:id="rId10"/>
+    <p:sldId id="279" r:id="rId11"/>
+    <p:sldId id="269" r:id="rId12"/>
     <p:sldId id="263" r:id="rId13"/>
   </p:sldIdLst>
   <p:sldSz cx="12801600" cy="7772400"/>
@@ -664,6 +664,99 @@
     <p:extLst>
       <p:ext uri="{BB962C8B-B14F-4D97-AF65-F5344CB8AC3E}">
         <p14:creationId xmlns:p14="http://schemas.microsoft.com/office/powerpoint/2010/main" val="2902947813"/>
+      </p:ext>
+    </p:extLst>
+  </p:cSld>
+  <p:clrMapOvr>
+    <a:masterClrMapping/>
+  </p:clrMapOvr>
+</p:notes>
+</file>
+
+<file path=ppt/notesSlides/notesSlide3.xml><?xml version="1.0" encoding="utf-8"?>
+<p:notes xmlns:a="http://schemas.openxmlformats.org/drawingml/2006/main" xmlns:r="http://schemas.openxmlformats.org/officeDocument/2006/relationships" xmlns:p="http://schemas.openxmlformats.org/presentationml/2006/main">
+  <p:cSld>
+    <p:spTree>
+      <p:nvGrpSpPr>
+        <p:cNvPr id="1" name=""/>
+        <p:cNvGrpSpPr/>
+        <p:nvPr/>
+      </p:nvGrpSpPr>
+      <p:grpSpPr>
+        <a:xfrm>
+          <a:off x="0" y="0"/>
+          <a:ext cx="0" cy="0"/>
+          <a:chOff x="0" y="0"/>
+          <a:chExt cx="0" cy="0"/>
+        </a:xfrm>
+      </p:grpSpPr>
+      <p:sp>
+        <p:nvSpPr>
+          <p:cNvPr id="2" name="Slide Image Placeholder 1"/>
+          <p:cNvSpPr>
+            <a:spLocks noGrp="1" noRot="1" noChangeAspect="1"/>
+          </p:cNvSpPr>
+          <p:nvPr>
+            <p:ph type="sldImg"/>
+          </p:nvPr>
+        </p:nvSpPr>
+        <p:spPr/>
+      </p:sp>
+      <p:sp>
+        <p:nvSpPr>
+          <p:cNvPr id="3" name="Notes Placeholder 2"/>
+          <p:cNvSpPr>
+            <a:spLocks noGrp="1"/>
+          </p:cNvSpPr>
+          <p:nvPr>
+            <p:ph type="body" idx="1"/>
+          </p:nvPr>
+        </p:nvSpPr>
+        <p:spPr/>
+        <p:txBody>
+          <a:bodyPr/>
+          <a:lstStyle/>
+          <a:p>
+            <a:r>
+              <a:rPr lang="en-US" dirty="0" smtClean="0"/>
+              <a:t>Put</a:t>
+            </a:r>
+            <a:r>
+              <a:rPr lang="en-US" baseline="0" dirty="0" smtClean="0"/>
+              <a:t> “hook” here for technical debt as one of the metrics</a:t>
+            </a:r>
+            <a:endParaRPr lang="en-US" dirty="0"/>
+          </a:p>
+        </p:txBody>
+      </p:sp>
+      <p:sp>
+        <p:nvSpPr>
+          <p:cNvPr id="4" name="Slide Number Placeholder 3"/>
+          <p:cNvSpPr>
+            <a:spLocks noGrp="1"/>
+          </p:cNvSpPr>
+          <p:nvPr>
+            <p:ph type="sldNum" sz="quarter" idx="10"/>
+          </p:nvPr>
+        </p:nvSpPr>
+        <p:spPr/>
+        <p:txBody>
+          <a:bodyPr/>
+          <a:lstStyle/>
+          <a:p>
+            <a:fld id="{5AA16CCA-5F5A-48E3-815C-EA1C3CA1BE69}" type="slidenum">
+              <a:rPr lang="en-US" smtClean="0"/>
+              <a:pPr/>
+              <a:t>7</a:t>
+            </a:fld>
+            <a:endParaRPr lang="en-US"/>
+          </a:p>
+        </p:txBody>
+      </p:sp>
+    </p:spTree>
+    <p:extLst>
+      <p:ext uri="{BB962C8B-B14F-4D97-AF65-F5344CB8AC3E}">
+        <p14:creationId xmlns:p14="http://schemas.microsoft.com/office/powerpoint/2010/main" val="625349990"/>
       </p:ext>
     </p:extLst>
   </p:cSld>
@@ -3961,7 +4054,7 @@
         </p:nvSpPr>
         <p:spPr>
           <a:xfrm>
-            <a:off x="746760" y="-86360"/>
+            <a:off x="533400" y="162560"/>
             <a:ext cx="11521440" cy="1209040"/>
           </a:xfrm>
         </p:spPr>
@@ -3978,7 +4071,7 @@
                   <a:srgbClr val="FF0000"/>
                 </a:solidFill>
               </a:rPr>
-              <a:t>Approach evaluation</a:t>
+              <a:t>Research questions</a:t>
             </a:r>
             <a:endParaRPr lang="en-US" sz="6200" b="1" dirty="0">
               <a:solidFill>
@@ -4008,20 +4101,20 @@
               <a:pPr/>
               <a:t>10</a:t>
             </a:fld>
-            <a:endParaRPr lang="en-US"/>
-          </a:p>
-        </p:txBody>
-      </p:sp>
-      <p:sp>
-        <p:nvSpPr>
-          <p:cNvPr id="7" name="TextBox 6"/>
+            <a:endParaRPr lang="en-US" dirty="0"/>
+          </a:p>
+        </p:txBody>
+      </p:sp>
+      <p:sp>
+        <p:nvSpPr>
+          <p:cNvPr id="8" name="TextBox 7"/>
           <p:cNvSpPr txBox="1"/>
           <p:nvPr/>
         </p:nvSpPr>
         <p:spPr>
           <a:xfrm>
-            <a:off x="3083194" y="2928345"/>
-            <a:ext cx="237424" cy="472655"/>
+            <a:off x="213360" y="1468120"/>
+            <a:ext cx="12588240" cy="2950256"/>
           </a:xfrm>
           <a:prstGeom prst="rect">
             <a:avLst/>
@@ -4029,49 +4122,33 @@
           <a:noFill/>
         </p:spPr>
         <p:txBody>
-          <a:bodyPr wrap="none" lIns="117564" tIns="58782" rIns="117564" bIns="58782" rtlCol="0">
+          <a:bodyPr wrap="square" lIns="117564" tIns="58782" rIns="117564" bIns="58782" rtlCol="0">
             <a:spAutoFit/>
           </a:bodyPr>
           <a:lstStyle/>
           <a:p>
-            <a:endParaRPr lang="en-US" dirty="0"/>
-          </a:p>
-        </p:txBody>
-      </p:sp>
-      <p:pic>
-        <p:nvPicPr>
-          <p:cNvPr id="29" name="Picture 28" descr="Screenshot 2015-02-17 17.47.43.png"/>
-          <p:cNvPicPr>
-            <a:picLocks noChangeAspect="1"/>
-          </p:cNvPicPr>
-          <p:nvPr/>
-        </p:nvPicPr>
-        <p:blipFill>
-          <a:blip r:embed="rId2">
-            <a:extLst>
-              <a:ext uri="{28A0092B-C50C-407E-A947-70E740481C1C}">
-                <a14:useLocalDpi xmlns:a14="http://schemas.microsoft.com/office/drawing/2010/main" val="0"/>
-              </a:ext>
-            </a:extLst>
-          </a:blip>
-          <a:stretch>
-            <a:fillRect/>
-          </a:stretch>
-        </p:blipFill>
-        <p:spPr>
-          <a:xfrm>
-            <a:off x="858846" y="1371600"/>
-            <a:ext cx="10571154" cy="5867400"/>
-          </a:xfrm>
-          <a:prstGeom prst="rect">
-            <a:avLst/>
-          </a:prstGeom>
-        </p:spPr>
-      </p:pic>
+            <a:endParaRPr lang="en-CA" sz="4600" b="1" dirty="0" smtClean="0"/>
+          </a:p>
+          <a:p>
+            <a:r>
+              <a:rPr lang="en-CA" sz="4600" b="1" dirty="0" smtClean="0"/>
+              <a:t>RQ3 </a:t>
+            </a:r>
+            <a:r>
+              <a:rPr lang="en-CA" sz="4600" b="1" dirty="0"/>
+              <a:t>- How Technical Debt can influence the bug proneness of the source code in the project ?</a:t>
+            </a:r>
+            <a:endParaRPr lang="en-CA" sz="4600" b="1" dirty="0" smtClean="0"/>
+          </a:p>
+          <a:p>
+            <a:endParaRPr lang="en-CA" sz="4600" b="1" dirty="0"/>
+          </a:p>
+        </p:txBody>
+      </p:sp>
     </p:spTree>
     <p:extLst>
       <p:ext uri="{BB962C8B-B14F-4D97-AF65-F5344CB8AC3E}">
-        <p14:creationId xmlns:p14="http://schemas.microsoft.com/office/powerpoint/2010/main" val="2628840364"/>
+        <p14:creationId xmlns:p14="http://schemas.microsoft.com/office/powerpoint/2010/main" val="3786026389"/>
       </p:ext>
     </p:extLst>
   </p:cSld>
@@ -4117,7 +4194,7 @@
         </p:nvSpPr>
         <p:spPr>
           <a:xfrm>
-            <a:off x="746760" y="-86360"/>
+            <a:off x="365760" y="152400"/>
             <a:ext cx="11521440" cy="1209040"/>
           </a:xfrm>
         </p:spPr>
@@ -4134,7 +4211,23 @@
                   <a:srgbClr val="FF0000"/>
                 </a:solidFill>
               </a:rPr>
-              <a:t>Approach evaluation</a:t>
+              <a:t>Mining </a:t>
+            </a:r>
+            <a:r>
+              <a:rPr lang="en-US" sz="6200" b="1" dirty="0" err="1" smtClean="0">
+                <a:solidFill>
+                  <a:srgbClr val="FF0000"/>
+                </a:solidFill>
+              </a:rPr>
+              <a:t>GitHub</a:t>
+            </a:r>
+            <a:r>
+              <a:rPr lang="en-US" sz="6200" b="1" dirty="0" smtClean="0">
+                <a:solidFill>
+                  <a:srgbClr val="FF0000"/>
+                </a:solidFill>
+              </a:rPr>
+              <a:t> repositories</a:t>
             </a:r>
             <a:endParaRPr lang="en-US" sz="6200" b="1" dirty="0">
               <a:solidFill>
@@ -4168,120 +4261,10 @@
           </a:p>
         </p:txBody>
       </p:sp>
-      <p:sp>
-        <p:nvSpPr>
-          <p:cNvPr id="7" name="TextBox 6"/>
-          <p:cNvSpPr txBox="1"/>
-          <p:nvPr/>
-        </p:nvSpPr>
-        <p:spPr>
-          <a:xfrm>
-            <a:off x="3083194" y="2928345"/>
-            <a:ext cx="237424" cy="472655"/>
-          </a:xfrm>
-          <a:prstGeom prst="rect">
-            <a:avLst/>
-          </a:prstGeom>
-          <a:noFill/>
-        </p:spPr>
-        <p:txBody>
-          <a:bodyPr wrap="none" lIns="117564" tIns="58782" rIns="117564" bIns="58782" rtlCol="0">
-            <a:spAutoFit/>
-          </a:bodyPr>
-          <a:lstStyle/>
-          <a:p>
-            <a:endParaRPr lang="en-US" dirty="0"/>
-          </a:p>
-        </p:txBody>
-      </p:sp>
-      <p:pic>
-        <p:nvPicPr>
-          <p:cNvPr id="18" name="Picture 17" descr="Screenshot 2015-02-17 17.47.29.png"/>
-          <p:cNvPicPr>
-            <a:picLocks noChangeAspect="1"/>
-          </p:cNvPicPr>
-          <p:nvPr/>
-        </p:nvPicPr>
-        <p:blipFill>
-          <a:blip r:embed="rId2">
-            <a:extLst>
-              <a:ext uri="{28A0092B-C50C-407E-A947-70E740481C1C}">
-                <a14:useLocalDpi xmlns:a14="http://schemas.microsoft.com/office/drawing/2010/main" val="0"/>
-              </a:ext>
-            </a:extLst>
-          </a:blip>
-          <a:stretch>
-            <a:fillRect/>
-          </a:stretch>
-        </p:blipFill>
-        <p:spPr>
-          <a:xfrm>
-            <a:off x="762000" y="5549900"/>
-            <a:ext cx="7696200" cy="2222500"/>
-          </a:xfrm>
-          <a:prstGeom prst="rect">
-            <a:avLst/>
-          </a:prstGeom>
-        </p:spPr>
-      </p:pic>
-      <p:pic>
-        <p:nvPicPr>
-          <p:cNvPr id="19" name="Picture 18" descr="Screenshot 2015-02-17 17.47.21.png"/>
-          <p:cNvPicPr>
-            <a:picLocks noChangeAspect="1"/>
-          </p:cNvPicPr>
-          <p:nvPr/>
-        </p:nvPicPr>
-        <p:blipFill>
-          <a:blip r:embed="rId3">
-            <a:extLst>
-              <a:ext uri="{28A0092B-C50C-407E-A947-70E740481C1C}">
-                <a14:useLocalDpi xmlns:a14="http://schemas.microsoft.com/office/drawing/2010/main" val="0"/>
-              </a:ext>
-            </a:extLst>
-          </a:blip>
-          <a:stretch>
-            <a:fillRect/>
-          </a:stretch>
-        </p:blipFill>
-        <p:spPr>
-          <a:xfrm>
-            <a:off x="762000" y="1194220"/>
-            <a:ext cx="6419754" cy="4520780"/>
-          </a:xfrm>
-          <a:prstGeom prst="rect">
-            <a:avLst/>
-          </a:prstGeom>
-        </p:spPr>
-      </p:pic>
-      <p:pic>
-        <p:nvPicPr>
-          <p:cNvPr id="21" name="Picture 20"/>
-          <p:cNvPicPr>
-            <a:picLocks noChangeAspect="1"/>
-          </p:cNvPicPr>
-          <p:nvPr/>
-        </p:nvPicPr>
-        <p:blipFill>
-          <a:blip r:embed="rId4"/>
-          <a:stretch>
-            <a:fillRect/>
-          </a:stretch>
-        </p:blipFill>
-        <p:spPr>
-          <a:xfrm>
-            <a:off x="7772400" y="990600"/>
-            <a:ext cx="4432300" cy="4432300"/>
-          </a:xfrm>
-          <a:prstGeom prst="rect">
-            <a:avLst/>
-          </a:prstGeom>
-        </p:spPr>
-      </p:pic>
     </p:spTree>
     <p:extLst>
       <p:ext uri="{BB962C8B-B14F-4D97-AF65-F5344CB8AC3E}">
-        <p14:creationId xmlns:p14="http://schemas.microsoft.com/office/powerpoint/2010/main" val="2676113607"/>
+        <p14:creationId xmlns:p14="http://schemas.microsoft.com/office/powerpoint/2010/main" val="2529443736"/>
       </p:ext>
     </p:extLst>
   </p:cSld>
@@ -4315,9 +4298,72 @@
           <a:chExt cx="0" cy="0"/>
         </a:xfrm>
       </p:grpSpPr>
+      <p:sp>
+        <p:nvSpPr>
+          <p:cNvPr id="2" name="Title 1"/>
+          <p:cNvSpPr>
+            <a:spLocks noGrp="1"/>
+          </p:cNvSpPr>
+          <p:nvPr>
+            <p:ph type="title"/>
+          </p:nvPr>
+        </p:nvSpPr>
+        <p:spPr>
+          <a:xfrm>
+            <a:off x="381000" y="838200"/>
+            <a:ext cx="11521440" cy="1209040"/>
+          </a:xfrm>
+        </p:spPr>
+        <p:txBody>
+          <a:bodyPr>
+            <a:normAutofit/>
+          </a:bodyPr>
+          <a:lstStyle/>
+          <a:p>
+            <a:pPr algn="l"/>
+            <a:r>
+              <a:rPr lang="en-US" sz="6200" b="1" dirty="0" smtClean="0">
+                <a:solidFill>
+                  <a:srgbClr val="FF0000"/>
+                </a:solidFill>
+              </a:rPr>
+              <a:t>Questions ?</a:t>
+            </a:r>
+            <a:endParaRPr lang="en-US" sz="6200" b="1" dirty="0">
+              <a:solidFill>
+                <a:srgbClr val="FF0000"/>
+              </a:solidFill>
+            </a:endParaRPr>
+          </a:p>
+        </p:txBody>
+      </p:sp>
+      <p:sp>
+        <p:nvSpPr>
+          <p:cNvPr id="4" name="Slide Number Placeholder 3"/>
+          <p:cNvSpPr>
+            <a:spLocks noGrp="1"/>
+          </p:cNvSpPr>
+          <p:nvPr>
+            <p:ph type="sldNum" sz="quarter" idx="12"/>
+          </p:nvPr>
+        </p:nvSpPr>
+        <p:spPr/>
+        <p:txBody>
+          <a:bodyPr/>
+          <a:lstStyle/>
+          <a:p>
+            <a:fld id="{B59E0FA8-C702-46DF-866D-6C24B4B825E8}" type="slidenum">
+              <a:rPr lang="en-US" smtClean="0"/>
+              <a:pPr/>
+              <a:t>12</a:t>
+            </a:fld>
+            <a:endParaRPr lang="en-US"/>
+          </a:p>
+        </p:txBody>
+      </p:sp>
       <p:pic>
         <p:nvPicPr>
-          <p:cNvPr id="3" name="Picture 2"/>
+          <p:cNvPr id="9" name="Picture 8"/>
           <p:cNvPicPr>
             <a:picLocks noChangeAspect="1"/>
           </p:cNvPicPr>
@@ -4331,181 +4377,14 @@
         </p:blipFill>
         <p:spPr>
           <a:xfrm>
-            <a:off x="10187596" y="5181600"/>
-            <a:ext cx="1852004" cy="1581383"/>
+            <a:off x="7874000" y="3703320"/>
+            <a:ext cx="4546600" cy="3637280"/>
           </a:xfrm>
           <a:prstGeom prst="rect">
             <a:avLst/>
           </a:prstGeom>
         </p:spPr>
       </p:pic>
-      <p:sp>
-        <p:nvSpPr>
-          <p:cNvPr id="2" name="Title 1"/>
-          <p:cNvSpPr>
-            <a:spLocks noGrp="1"/>
-          </p:cNvSpPr>
-          <p:nvPr>
-            <p:ph type="title"/>
-          </p:nvPr>
-        </p:nvSpPr>
-        <p:spPr>
-          <a:xfrm>
-            <a:off x="746760" y="518160"/>
-            <a:ext cx="11521440" cy="1209040"/>
-          </a:xfrm>
-        </p:spPr>
-        <p:txBody>
-          <a:bodyPr>
-            <a:normAutofit/>
-          </a:bodyPr>
-          <a:lstStyle/>
-          <a:p>
-            <a:pPr algn="l"/>
-            <a:r>
-              <a:rPr lang="en-US" sz="6200" b="1" dirty="0">
-                <a:solidFill>
-                  <a:srgbClr val="FF0000"/>
-                </a:solidFill>
-              </a:rPr>
-              <a:t>Advantages</a:t>
-            </a:r>
-          </a:p>
-        </p:txBody>
-      </p:sp>
-      <p:sp>
-        <p:nvSpPr>
-          <p:cNvPr id="4" name="Slide Number Placeholder 3"/>
-          <p:cNvSpPr>
-            <a:spLocks noGrp="1"/>
-          </p:cNvSpPr>
-          <p:nvPr>
-            <p:ph type="sldNum" sz="quarter" idx="12"/>
-          </p:nvPr>
-        </p:nvSpPr>
-        <p:spPr/>
-        <p:txBody>
-          <a:bodyPr/>
-          <a:lstStyle/>
-          <a:p>
-            <a:fld id="{B59E0FA8-C702-46DF-866D-6C24B4B825E8}" type="slidenum">
-              <a:rPr lang="en-US" smtClean="0"/>
-              <a:pPr/>
-              <a:t>12</a:t>
-            </a:fld>
-            <a:endParaRPr lang="en-US"/>
-          </a:p>
-        </p:txBody>
-      </p:sp>
-      <p:sp>
-        <p:nvSpPr>
-          <p:cNvPr id="8" name="TextBox 7"/>
-          <p:cNvSpPr txBox="1"/>
-          <p:nvPr/>
-        </p:nvSpPr>
-        <p:spPr>
-          <a:xfrm>
-            <a:off x="746760" y="2086470"/>
-            <a:ext cx="11734800" cy="8074737"/>
-          </a:xfrm>
-          <a:prstGeom prst="rect">
-            <a:avLst/>
-          </a:prstGeom>
-          <a:noFill/>
-        </p:spPr>
-        <p:txBody>
-          <a:bodyPr wrap="square" lIns="117564" tIns="58782" rIns="117564" bIns="58782" rtlCol="0">
-            <a:spAutoFit/>
-          </a:bodyPr>
-          <a:lstStyle/>
-          <a:p>
-            <a:pPr marL="734778" indent="-734778">
-              <a:buFontTx/>
-              <a:buChar char="-"/>
-            </a:pPr>
-            <a:r>
-              <a:rPr lang="en-CA" sz="4100" b="1" dirty="0"/>
-              <a:t>Developer input/confessions about the system are taken into consideration</a:t>
-            </a:r>
-          </a:p>
-          <a:p>
-            <a:endParaRPr lang="en-CA" sz="4100" b="1" dirty="0" smtClean="0"/>
-          </a:p>
-          <a:p>
-            <a:pPr marL="734778" indent="-734778">
-              <a:buFontTx/>
-              <a:buChar char="-"/>
-            </a:pPr>
-            <a:r>
-              <a:rPr lang="en-CA" sz="4100" b="1" dirty="0" smtClean="0"/>
-              <a:t>Self</a:t>
-            </a:r>
-            <a:r>
-              <a:rPr lang="en-CA" sz="4100" b="1" dirty="0"/>
-              <a:t>-admitted design debt </a:t>
-            </a:r>
-            <a:r>
-              <a:rPr lang="en-CA" sz="4100" b="1" dirty="0" smtClean="0"/>
-              <a:t>could guide </a:t>
-            </a:r>
-            <a:r>
-              <a:rPr lang="en-CA" sz="4100" b="1" dirty="0"/>
-              <a:t>the process of refactoring recommendation</a:t>
-            </a:r>
-            <a:r>
-              <a:rPr lang="en-CA" sz="4100" b="1" dirty="0" smtClean="0"/>
-              <a:t>.</a:t>
-            </a:r>
-          </a:p>
-          <a:p>
-            <a:pPr marL="734778" indent="-734778">
-              <a:buFontTx/>
-              <a:buChar char="-"/>
-            </a:pPr>
-            <a:endParaRPr lang="en-CA" sz="4100" b="1" dirty="0" smtClean="0"/>
-          </a:p>
-          <a:p>
-            <a:pPr marL="734778" indent="-734778">
-              <a:buFontTx/>
-              <a:buChar char="-"/>
-            </a:pPr>
-            <a:r>
-              <a:rPr lang="en-CA" sz="4100" b="1" dirty="0" smtClean="0"/>
-              <a:t> </a:t>
-            </a:r>
-            <a:r>
-              <a:rPr lang="en-CA" sz="4100" b="1" dirty="0"/>
-              <a:t>A light-weight approach</a:t>
-            </a:r>
-          </a:p>
-          <a:p>
-            <a:pPr marL="734778" indent="-734778">
-              <a:buFontTx/>
-              <a:buChar char="-"/>
-            </a:pPr>
-            <a:endParaRPr lang="en-CA" sz="4100" b="1" dirty="0"/>
-          </a:p>
-          <a:p>
-            <a:endParaRPr lang="en-CA" sz="5100" b="1" dirty="0"/>
-          </a:p>
-          <a:p>
-            <a:endParaRPr lang="en-CA" sz="4600" b="1" dirty="0"/>
-          </a:p>
-          <a:p>
-            <a:pPr marL="734778" indent="-734778">
-              <a:buFontTx/>
-              <a:buChar char="-"/>
-            </a:pPr>
-            <a:endParaRPr lang="en-CA" sz="4600" b="1" dirty="0"/>
-          </a:p>
-          <a:p>
-            <a:r>
-              <a:rPr lang="en-CA" sz="4600" b="1" dirty="0"/>
-              <a:t> </a:t>
-            </a:r>
-          </a:p>
-        </p:txBody>
-      </p:sp>
     </p:spTree>
   </p:cSld>
   <p:clrMapOvr>
@@ -4974,26 +4853,33 @@
         </p:nvSpPr>
         <p:spPr>
           <a:xfrm>
-            <a:off x="533400" y="162560"/>
+            <a:off x="213360" y="152400"/>
             <a:ext cx="11521440" cy="1209040"/>
           </a:xfrm>
         </p:spPr>
         <p:txBody>
           <a:bodyPr>
-            <a:normAutofit/>
+            <a:noAutofit/>
           </a:bodyPr>
           <a:lstStyle/>
           <a:p>
-            <a:pPr algn="l"/>
-            <a:r>
-              <a:rPr lang="en-US" sz="6200" b="1" dirty="0" smtClean="0">
+            <a:r>
+              <a:rPr lang="en-US" sz="5400" b="1" dirty="0">
                 <a:solidFill>
                   <a:srgbClr val="FF0000"/>
                 </a:solidFill>
               </a:rPr>
-              <a:t>Research questions</a:t>
-            </a:r>
-            <a:endParaRPr lang="en-US" sz="6200" b="1" dirty="0">
+              <a:t>Case study on </a:t>
+            </a:r>
+            <a:r>
+              <a:rPr lang="en-US" sz="5400" b="1" dirty="0" smtClean="0">
+                <a:solidFill>
+                  <a:srgbClr val="FF0000"/>
+                </a:solidFill>
+              </a:rPr>
+              <a:t>ten open source projects</a:t>
+            </a:r>
+            <a:endParaRPr lang="en-US" sz="5400" b="1" dirty="0">
               <a:solidFill>
                 <a:srgbClr val="FF0000"/>
               </a:solidFill>
@@ -5021,20 +4907,20 @@
               <a:pPr/>
               <a:t>5</a:t>
             </a:fld>
-            <a:endParaRPr lang="en-US" dirty="0"/>
-          </a:p>
-        </p:txBody>
-      </p:sp>
-      <p:sp>
-        <p:nvSpPr>
-          <p:cNvPr id="8" name="TextBox 7"/>
+            <a:endParaRPr lang="en-US"/>
+          </a:p>
+        </p:txBody>
+      </p:sp>
+      <p:sp>
+        <p:nvSpPr>
+          <p:cNvPr id="7" name="TextBox 6"/>
           <p:cNvSpPr txBox="1"/>
           <p:nvPr/>
         </p:nvSpPr>
         <p:spPr>
           <a:xfrm>
-            <a:off x="213360" y="1468120"/>
-            <a:ext cx="12588240" cy="5073915"/>
+            <a:off x="3723274" y="2841985"/>
+            <a:ext cx="237424" cy="472655"/>
           </a:xfrm>
           <a:prstGeom prst="rect">
             <a:avLst/>
@@ -5042,46 +4928,1275 @@
           <a:noFill/>
         </p:spPr>
         <p:txBody>
-          <a:bodyPr wrap="square" lIns="117564" tIns="58782" rIns="117564" bIns="58782" rtlCol="0">
+          <a:bodyPr wrap="none" lIns="117564" tIns="58782" rIns="117564" bIns="58782" rtlCol="0">
             <a:spAutoFit/>
           </a:bodyPr>
           <a:lstStyle/>
           <a:p>
-            <a:endParaRPr lang="en-CA" sz="4600" b="1" dirty="0" smtClean="0"/>
-          </a:p>
-          <a:p>
-            <a:r>
-              <a:rPr lang="en-CA" sz="4600" b="1" dirty="0" smtClean="0"/>
-              <a:t>RQ1 - How JavaScript </a:t>
-            </a:r>
-            <a:r>
-              <a:rPr lang="en-CA" sz="4600" b="1" dirty="0"/>
-              <a:t>language projects evolve in </a:t>
-            </a:r>
-            <a:r>
-              <a:rPr lang="en-CA" sz="4600" b="1" dirty="0" smtClean="0"/>
-              <a:t>comparison </a:t>
-            </a:r>
-            <a:r>
-              <a:rPr lang="en-CA" sz="4600" b="1" dirty="0"/>
-              <a:t>with projects written in </a:t>
-            </a:r>
-            <a:r>
-              <a:rPr lang="en-CA" sz="4600" b="1" dirty="0" smtClean="0"/>
-              <a:t>compiled languages?</a:t>
-            </a:r>
-          </a:p>
-          <a:p>
-            <a:endParaRPr lang="en-CA" sz="4600" b="1" dirty="0" smtClean="0"/>
-          </a:p>
-          <a:p>
-            <a:endParaRPr lang="en-CA" sz="4600" b="1" dirty="0" smtClean="0"/>
-          </a:p>
-          <a:p>
-            <a:endParaRPr lang="en-CA" sz="4600" b="1" dirty="0"/>
-          </a:p>
-        </p:txBody>
-      </p:sp>
+            <a:endParaRPr lang="en-US" dirty="0"/>
+          </a:p>
+        </p:txBody>
+      </p:sp>
+      <p:graphicFrame>
+        <p:nvGraphicFramePr>
+          <p:cNvPr id="5" name="Table 4"/>
+          <p:cNvGraphicFramePr>
+            <a:graphicFrameLocks noGrp="1"/>
+          </p:cNvGraphicFramePr>
+          <p:nvPr>
+            <p:extLst>
+              <p:ext uri="{D42A27DB-BD31-4B8C-83A1-F6EECF244321}">
+                <p14:modId xmlns:p14="http://schemas.microsoft.com/office/powerpoint/2010/main" val="475878315"/>
+              </p:ext>
+            </p:extLst>
+          </p:nvPr>
+        </p:nvGraphicFramePr>
+        <p:xfrm>
+          <a:off x="793115" y="1600200"/>
+          <a:ext cx="11475084" cy="2651760"/>
+        </p:xfrm>
+        <a:graphic>
+          <a:graphicData uri="http://schemas.openxmlformats.org/drawingml/2006/table">
+            <a:tbl>
+              <a:tblPr firstRow="1" bandRow="1">
+                <a:tableStyleId>{5C22544A-7EE6-4342-B048-85BDC9FD1C3A}</a:tableStyleId>
+              </a:tblPr>
+              <a:tblGrid>
+                <a:gridCol w="1763226"/>
+                <a:gridCol w="997309"/>
+                <a:gridCol w="1536274"/>
+                <a:gridCol w="1378179"/>
+                <a:gridCol w="1602039"/>
+                <a:gridCol w="4198057"/>
+              </a:tblGrid>
+              <a:tr h="0">
+                <a:tc>
+                  <a:txBody>
+                    <a:bodyPr/>
+                    <a:lstStyle/>
+                    <a:p>
+                      <a:r>
+                        <a:rPr lang="en-US" dirty="0" smtClean="0"/>
+                        <a:t>Project</a:t>
+                      </a:r>
+                      <a:endParaRPr lang="en-US" dirty="0"/>
+                    </a:p>
+                  </a:txBody>
+                  <a:tcPr/>
+                </a:tc>
+                <a:tc>
+                  <a:txBody>
+                    <a:bodyPr/>
+                    <a:lstStyle/>
+                    <a:p>
+                      <a:r>
+                        <a:rPr lang="en-US" baseline="0" dirty="0" smtClean="0"/>
+                        <a:t>Files</a:t>
+                      </a:r>
+                      <a:endParaRPr lang="en-US" dirty="0"/>
+                    </a:p>
+                  </a:txBody>
+                  <a:tcPr/>
+                </a:tc>
+                <a:tc>
+                  <a:txBody>
+                    <a:bodyPr/>
+                    <a:lstStyle/>
+                    <a:p>
+                      <a:r>
+                        <a:rPr lang="en-US" dirty="0" smtClean="0"/>
+                        <a:t>D</a:t>
+                      </a:r>
+                      <a:r>
+                        <a:rPr lang="en-US" baseline="0" dirty="0" smtClean="0"/>
+                        <a:t>irectories</a:t>
+                      </a:r>
+                      <a:endParaRPr lang="en-US" dirty="0"/>
+                    </a:p>
+                  </a:txBody>
+                  <a:tcPr/>
+                </a:tc>
+                <a:tc>
+                  <a:txBody>
+                    <a:bodyPr/>
+                    <a:lstStyle/>
+                    <a:p>
+                      <a:r>
+                        <a:rPr lang="en-US" dirty="0" smtClean="0"/>
+                        <a:t>Functions</a:t>
+                      </a:r>
+                      <a:endParaRPr lang="en-US" dirty="0"/>
+                    </a:p>
+                  </a:txBody>
+                  <a:tcPr/>
+                </a:tc>
+                <a:tc>
+                  <a:txBody>
+                    <a:bodyPr/>
+                    <a:lstStyle/>
+                    <a:p>
+                      <a:r>
+                        <a:rPr lang="en-US" dirty="0" smtClean="0"/>
+                        <a:t>Statements</a:t>
+                      </a:r>
+                      <a:endParaRPr lang="en-US" dirty="0"/>
+                    </a:p>
+                  </a:txBody>
+                  <a:tcPr/>
+                </a:tc>
+                <a:tc>
+                  <a:txBody>
+                    <a:bodyPr/>
+                    <a:lstStyle/>
+                    <a:p>
+                      <a:r>
+                        <a:rPr lang="en-US" dirty="0" smtClean="0"/>
+                        <a:t>Description</a:t>
+                      </a:r>
+                      <a:endParaRPr lang="en-US" dirty="0"/>
+                    </a:p>
+                  </a:txBody>
+                  <a:tcPr/>
+                </a:tc>
+              </a:tr>
+              <a:tr h="370840">
+                <a:tc>
+                  <a:txBody>
+                    <a:bodyPr/>
+                    <a:lstStyle/>
+                    <a:p>
+                      <a:r>
+                        <a:rPr lang="en-US" dirty="0" smtClean="0"/>
+                        <a:t>NPM</a:t>
+                      </a:r>
+                      <a:endParaRPr lang="en-US" dirty="0"/>
+                    </a:p>
+                  </a:txBody>
+                  <a:tcPr/>
+                </a:tc>
+                <a:tc>
+                  <a:txBody>
+                    <a:bodyPr/>
+                    <a:lstStyle/>
+                    <a:p>
+                      <a:pPr algn="ctr"/>
+                      <a:r>
+                        <a:rPr lang="en-US" dirty="0" smtClean="0"/>
+                        <a:t>165</a:t>
+                      </a:r>
+                      <a:endParaRPr lang="en-US" dirty="0"/>
+                    </a:p>
+                  </a:txBody>
+                  <a:tcPr/>
+                </a:tc>
+                <a:tc>
+                  <a:txBody>
+                    <a:bodyPr/>
+                    <a:lstStyle/>
+                    <a:p>
+                      <a:pPr algn="ctr"/>
+                      <a:r>
+                        <a:rPr lang="en-US" dirty="0" smtClean="0"/>
+                        <a:t>32</a:t>
+                      </a:r>
+                      <a:endParaRPr lang="en-US" dirty="0"/>
+                    </a:p>
+                  </a:txBody>
+                  <a:tcPr/>
+                </a:tc>
+                <a:tc>
+                  <a:txBody>
+                    <a:bodyPr/>
+                    <a:lstStyle/>
+                    <a:p>
+                      <a:pPr algn="ctr"/>
+                      <a:r>
+                        <a:rPr lang="en-US" dirty="0" smtClean="0"/>
+                        <a:t>1217</a:t>
+                      </a:r>
+                      <a:endParaRPr lang="en-US" dirty="0"/>
+                    </a:p>
+                  </a:txBody>
+                  <a:tcPr/>
+                </a:tc>
+                <a:tc>
+                  <a:txBody>
+                    <a:bodyPr/>
+                    <a:lstStyle/>
+                    <a:p>
+                      <a:pPr algn="ctr"/>
+                      <a:r>
+                        <a:rPr lang="en-US" dirty="0" smtClean="0"/>
+                        <a:t>5329</a:t>
+                      </a:r>
+                      <a:endParaRPr lang="en-US" dirty="0"/>
+                    </a:p>
+                  </a:txBody>
+                  <a:tcPr/>
+                </a:tc>
+                <a:tc>
+                  <a:txBody>
+                    <a:bodyPr/>
+                    <a:lstStyle/>
+                    <a:p>
+                      <a:r>
+                        <a:rPr lang="en-US" dirty="0" smtClean="0"/>
+                        <a:t>A</a:t>
+                      </a:r>
+                      <a:r>
+                        <a:rPr lang="en-US" baseline="0" dirty="0" smtClean="0"/>
+                        <a:t> package manager for </a:t>
+                      </a:r>
+                      <a:r>
+                        <a:rPr lang="en-US" baseline="0" dirty="0" err="1" smtClean="0"/>
+                        <a:t>javascript</a:t>
+                      </a:r>
+                      <a:endParaRPr lang="en-US" dirty="0"/>
+                    </a:p>
+                  </a:txBody>
+                  <a:tcPr/>
+                </a:tc>
+              </a:tr>
+              <a:tr h="370840">
+                <a:tc>
+                  <a:txBody>
+                    <a:bodyPr/>
+                    <a:lstStyle/>
+                    <a:p>
+                      <a:r>
+                        <a:rPr lang="en-US" dirty="0" smtClean="0"/>
+                        <a:t>Node MySQL</a:t>
+                      </a:r>
+                      <a:endParaRPr lang="en-US" dirty="0"/>
+                    </a:p>
+                  </a:txBody>
+                  <a:tcPr/>
+                </a:tc>
+                <a:tc>
+                  <a:txBody>
+                    <a:bodyPr/>
+                    <a:lstStyle/>
+                    <a:p>
+                      <a:pPr algn="ctr"/>
+                      <a:r>
+                        <a:rPr lang="en-US" dirty="0" smtClean="0"/>
+                        <a:t>140</a:t>
+                      </a:r>
+                      <a:endParaRPr lang="en-US" dirty="0"/>
+                    </a:p>
+                  </a:txBody>
+                  <a:tcPr/>
+                </a:tc>
+                <a:tc>
+                  <a:txBody>
+                    <a:bodyPr/>
+                    <a:lstStyle/>
+                    <a:p>
+                      <a:pPr algn="ctr"/>
+                      <a:r>
+                        <a:rPr lang="en-US" dirty="0" smtClean="0"/>
+                        <a:t>11</a:t>
+                      </a:r>
+                      <a:endParaRPr lang="en-US" dirty="0"/>
+                    </a:p>
+                  </a:txBody>
+                  <a:tcPr/>
+                </a:tc>
+                <a:tc>
+                  <a:txBody>
+                    <a:bodyPr/>
+                    <a:lstStyle/>
+                    <a:p>
+                      <a:pPr algn="ctr"/>
+                      <a:r>
+                        <a:rPr lang="en-US" dirty="0" smtClean="0"/>
+                        <a:t>667</a:t>
+                      </a:r>
+                      <a:endParaRPr lang="en-US" dirty="0"/>
+                    </a:p>
+                  </a:txBody>
+                  <a:tcPr/>
+                </a:tc>
+                <a:tc>
+                  <a:txBody>
+                    <a:bodyPr/>
+                    <a:lstStyle/>
+                    <a:p>
+                      <a:pPr algn="ctr"/>
+                      <a:r>
+                        <a:rPr lang="en-US" dirty="0" smtClean="0"/>
+                        <a:t>3317</a:t>
+                      </a:r>
+                      <a:endParaRPr lang="en-US" dirty="0"/>
+                    </a:p>
+                  </a:txBody>
+                  <a:tcPr/>
+                </a:tc>
+                <a:tc>
+                  <a:txBody>
+                    <a:bodyPr/>
+                    <a:lstStyle/>
+                    <a:p>
+                      <a:r>
+                        <a:rPr lang="en-US" dirty="0" err="1" smtClean="0"/>
+                        <a:t>Node.js</a:t>
+                      </a:r>
+                      <a:r>
+                        <a:rPr lang="en-US" baseline="0" dirty="0" smtClean="0"/>
+                        <a:t> java script MySQL client </a:t>
+                      </a:r>
+                      <a:endParaRPr lang="en-US" dirty="0"/>
+                    </a:p>
+                  </a:txBody>
+                  <a:tcPr/>
+                </a:tc>
+              </a:tr>
+              <a:tr h="370840">
+                <a:tc>
+                  <a:txBody>
+                    <a:bodyPr/>
+                    <a:lstStyle/>
+                    <a:p>
+                      <a:r>
+                        <a:rPr lang="en-US" dirty="0" err="1" smtClean="0"/>
+                        <a:t>Esprima</a:t>
+                      </a:r>
+                      <a:endParaRPr lang="en-US" dirty="0"/>
+                    </a:p>
+                  </a:txBody>
+                  <a:tcPr/>
+                </a:tc>
+                <a:tc>
+                  <a:txBody>
+                    <a:bodyPr/>
+                    <a:lstStyle/>
+                    <a:p>
+                      <a:pPr algn="ctr"/>
+                      <a:r>
+                        <a:rPr lang="en-US" dirty="0" smtClean="0"/>
+                        <a:t>34</a:t>
+                      </a:r>
+                      <a:endParaRPr lang="en-US" dirty="0"/>
+                    </a:p>
+                  </a:txBody>
+                  <a:tcPr/>
+                </a:tc>
+                <a:tc>
+                  <a:txBody>
+                    <a:bodyPr/>
+                    <a:lstStyle/>
+                    <a:p>
+                      <a:pPr algn="ctr"/>
+                      <a:r>
+                        <a:rPr lang="en-US" dirty="0" smtClean="0"/>
+                        <a:t>6</a:t>
+                      </a:r>
+                      <a:endParaRPr lang="en-US" dirty="0"/>
+                    </a:p>
+                  </a:txBody>
+                  <a:tcPr/>
+                </a:tc>
+                <a:tc>
+                  <a:txBody>
+                    <a:bodyPr/>
+                    <a:lstStyle/>
+                    <a:p>
+                      <a:pPr algn="ctr"/>
+                      <a:r>
+                        <a:rPr lang="en-US" dirty="0" smtClean="0"/>
+                        <a:t>4862</a:t>
+                      </a:r>
+                      <a:endParaRPr lang="en-US" dirty="0"/>
+                    </a:p>
+                  </a:txBody>
+                  <a:tcPr/>
+                </a:tc>
+                <a:tc>
+                  <a:txBody>
+                    <a:bodyPr/>
+                    <a:lstStyle/>
+                    <a:p>
+                      <a:pPr algn="ctr"/>
+                      <a:r>
+                        <a:rPr lang="en-US" dirty="0" smtClean="0"/>
+                        <a:t>29002</a:t>
+                      </a:r>
+                      <a:endParaRPr lang="en-US" dirty="0"/>
+                    </a:p>
+                  </a:txBody>
+                  <a:tcPr/>
+                </a:tc>
+                <a:tc>
+                  <a:txBody>
+                    <a:bodyPr/>
+                    <a:lstStyle/>
+                    <a:p>
+                      <a:r>
+                        <a:rPr lang="en-US" dirty="0" err="1" smtClean="0"/>
+                        <a:t>Javascript</a:t>
+                      </a:r>
+                      <a:r>
+                        <a:rPr lang="en-US" baseline="0" dirty="0" smtClean="0"/>
+                        <a:t> parser </a:t>
+                      </a:r>
+                      <a:endParaRPr lang="en-US" dirty="0"/>
+                    </a:p>
+                  </a:txBody>
+                  <a:tcPr/>
+                </a:tc>
+              </a:tr>
+              <a:tr h="370840">
+                <a:tc>
+                  <a:txBody>
+                    <a:bodyPr/>
+                    <a:lstStyle/>
+                    <a:p>
+                      <a:r>
+                        <a:rPr lang="en-US" dirty="0" smtClean="0"/>
+                        <a:t>Grunt</a:t>
+                      </a:r>
+                      <a:endParaRPr lang="en-US" dirty="0"/>
+                    </a:p>
+                  </a:txBody>
+                  <a:tcPr/>
+                </a:tc>
+                <a:tc>
+                  <a:txBody>
+                    <a:bodyPr/>
+                    <a:lstStyle/>
+                    <a:p>
+                      <a:pPr algn="ctr"/>
+                      <a:r>
+                        <a:rPr lang="en-US" dirty="0" smtClean="0"/>
+                        <a:t>31</a:t>
+                      </a:r>
+                      <a:endParaRPr lang="en-US" dirty="0"/>
+                    </a:p>
+                  </a:txBody>
+                  <a:tcPr/>
+                </a:tc>
+                <a:tc>
+                  <a:txBody>
+                    <a:bodyPr/>
+                    <a:lstStyle/>
+                    <a:p>
+                      <a:pPr algn="ctr"/>
+                      <a:r>
+                        <a:rPr lang="en-US" dirty="0" smtClean="0"/>
+                        <a:t>9</a:t>
+                      </a:r>
+                      <a:endParaRPr lang="en-US" dirty="0"/>
+                    </a:p>
+                  </a:txBody>
+                  <a:tcPr/>
+                </a:tc>
+                <a:tc>
+                  <a:txBody>
+                    <a:bodyPr/>
+                    <a:lstStyle/>
+                    <a:p>
+                      <a:pPr algn="ctr"/>
+                      <a:r>
+                        <a:rPr lang="en-US" dirty="0" smtClean="0"/>
+                        <a:t>251</a:t>
+                      </a:r>
+                      <a:endParaRPr lang="en-US" dirty="0"/>
+                    </a:p>
+                  </a:txBody>
+                  <a:tcPr/>
+                </a:tc>
+                <a:tc>
+                  <a:txBody>
+                    <a:bodyPr/>
+                    <a:lstStyle/>
+                    <a:p>
+                      <a:pPr algn="ctr"/>
+                      <a:r>
+                        <a:rPr lang="en-US" dirty="0" smtClean="0"/>
+                        <a:t>1245</a:t>
+                      </a:r>
+                      <a:endParaRPr lang="en-US" dirty="0"/>
+                    </a:p>
+                  </a:txBody>
+                  <a:tcPr/>
+                </a:tc>
+                <a:tc>
+                  <a:txBody>
+                    <a:bodyPr/>
+                    <a:lstStyle/>
+                    <a:p>
+                      <a:r>
+                        <a:rPr lang="en-US" dirty="0" err="1" smtClean="0"/>
+                        <a:t>Javascript</a:t>
+                      </a:r>
+                      <a:r>
+                        <a:rPr lang="en-US" baseline="0" dirty="0" smtClean="0"/>
+                        <a:t> task runner</a:t>
+                      </a:r>
+                      <a:endParaRPr lang="en-US" dirty="0"/>
+                    </a:p>
+                  </a:txBody>
+                  <a:tcPr/>
+                </a:tc>
+              </a:tr>
+              <a:tr h="370840">
+                <a:tc>
+                  <a:txBody>
+                    <a:bodyPr/>
+                    <a:lstStyle/>
+                    <a:p>
+                      <a:r>
+                        <a:rPr lang="en-US" dirty="0" smtClean="0"/>
+                        <a:t>Node </a:t>
+                      </a:r>
+                      <a:r>
+                        <a:rPr lang="en-US" dirty="0" err="1" smtClean="0"/>
+                        <a:t>Redis</a:t>
+                      </a:r>
+                      <a:endParaRPr lang="en-US" dirty="0"/>
+                    </a:p>
+                  </a:txBody>
+                  <a:tcPr/>
+                </a:tc>
+                <a:tc>
+                  <a:txBody>
+                    <a:bodyPr/>
+                    <a:lstStyle/>
+                    <a:p>
+                      <a:pPr algn="ctr"/>
+                      <a:r>
+                        <a:rPr lang="en-US" dirty="0" smtClean="0"/>
+                        <a:t>18</a:t>
+                      </a:r>
+                      <a:endParaRPr lang="en-US" dirty="0"/>
+                    </a:p>
+                  </a:txBody>
+                  <a:tcPr/>
+                </a:tc>
+                <a:tc>
+                  <a:txBody>
+                    <a:bodyPr/>
+                    <a:lstStyle/>
+                    <a:p>
+                      <a:pPr algn="ctr"/>
+                      <a:r>
+                        <a:rPr lang="en-US" dirty="0" smtClean="0"/>
+                        <a:t>18</a:t>
+                      </a:r>
+                      <a:endParaRPr lang="en-US" dirty="0"/>
+                    </a:p>
+                  </a:txBody>
+                  <a:tcPr/>
+                </a:tc>
+                <a:tc>
+                  <a:txBody>
+                    <a:bodyPr/>
+                    <a:lstStyle/>
+                    <a:p>
+                      <a:pPr algn="ctr"/>
+                      <a:r>
+                        <a:rPr lang="en-US" dirty="0" smtClean="0"/>
+                        <a:t>457</a:t>
+                      </a:r>
+                      <a:endParaRPr lang="en-US" dirty="0"/>
+                    </a:p>
+                  </a:txBody>
+                  <a:tcPr/>
+                </a:tc>
+                <a:tc>
+                  <a:txBody>
+                    <a:bodyPr/>
+                    <a:lstStyle/>
+                    <a:p>
+                      <a:pPr algn="ctr"/>
+                      <a:r>
+                        <a:rPr lang="en-US" dirty="0" smtClean="0"/>
+                        <a:t>2537</a:t>
+                      </a:r>
+                      <a:endParaRPr lang="en-US" dirty="0"/>
+                    </a:p>
+                  </a:txBody>
+                  <a:tcPr/>
+                </a:tc>
+                <a:tc>
+                  <a:txBody>
+                    <a:bodyPr/>
+                    <a:lstStyle/>
+                    <a:p>
+                      <a:r>
+                        <a:rPr lang="en-US" dirty="0" err="1" smtClean="0"/>
+                        <a:t>Redis</a:t>
+                      </a:r>
+                      <a:r>
+                        <a:rPr lang="en-US" dirty="0" smtClean="0"/>
+                        <a:t> client for</a:t>
+                      </a:r>
+                      <a:r>
+                        <a:rPr lang="en-US" baseline="0" dirty="0" smtClean="0"/>
+                        <a:t> </a:t>
+                      </a:r>
+                      <a:r>
+                        <a:rPr lang="en-US" baseline="0" dirty="0" err="1" smtClean="0"/>
+                        <a:t>node.js</a:t>
+                      </a:r>
+                      <a:endParaRPr lang="en-US" dirty="0"/>
+                    </a:p>
+                  </a:txBody>
+                  <a:tcPr/>
+                </a:tc>
+              </a:tr>
+            </a:tbl>
+          </a:graphicData>
+        </a:graphic>
+      </p:graphicFrame>
+      <p:graphicFrame>
+        <p:nvGraphicFramePr>
+          <p:cNvPr id="8" name="Table 7"/>
+          <p:cNvGraphicFramePr>
+            <a:graphicFrameLocks noGrp="1"/>
+          </p:cNvGraphicFramePr>
+          <p:nvPr>
+            <p:extLst>
+              <p:ext uri="{D42A27DB-BD31-4B8C-83A1-F6EECF244321}">
+                <p14:modId xmlns:p14="http://schemas.microsoft.com/office/powerpoint/2010/main" val="3124627503"/>
+              </p:ext>
+            </p:extLst>
+          </p:nvPr>
+        </p:nvGraphicFramePr>
+        <p:xfrm>
+          <a:off x="793115" y="4724400"/>
+          <a:ext cx="11494755" cy="2651760"/>
+        </p:xfrm>
+        <a:graphic>
+          <a:graphicData uri="http://schemas.openxmlformats.org/drawingml/2006/table">
+            <a:tbl>
+              <a:tblPr firstRow="1" bandRow="1">
+                <a:tableStyleId>{5C22544A-7EE6-4342-B048-85BDC9FD1C3A}</a:tableStyleId>
+              </a:tblPr>
+              <a:tblGrid>
+                <a:gridCol w="1732280"/>
+                <a:gridCol w="979805"/>
+                <a:gridCol w="1509311"/>
+                <a:gridCol w="1353990"/>
+                <a:gridCol w="1573921"/>
+                <a:gridCol w="4345448"/>
+              </a:tblGrid>
+              <a:tr h="0">
+                <a:tc>
+                  <a:txBody>
+                    <a:bodyPr/>
+                    <a:lstStyle/>
+                    <a:p>
+                      <a:r>
+                        <a:rPr lang="en-US" dirty="0" smtClean="0">
+                          <a:solidFill>
+                            <a:schemeClr val="bg1"/>
+                          </a:solidFill>
+                        </a:rPr>
+                        <a:t>Project</a:t>
+                      </a:r>
+                      <a:endParaRPr lang="en-US" dirty="0">
+                        <a:solidFill>
+                          <a:schemeClr val="bg1"/>
+                        </a:solidFill>
+                      </a:endParaRPr>
+                    </a:p>
+                  </a:txBody>
+                  <a:tcPr/>
+                </a:tc>
+                <a:tc>
+                  <a:txBody>
+                    <a:bodyPr/>
+                    <a:lstStyle/>
+                    <a:p>
+                      <a:r>
+                        <a:rPr lang="en-US" baseline="0" dirty="0" smtClean="0">
+                          <a:solidFill>
+                            <a:schemeClr val="bg1"/>
+                          </a:solidFill>
+                        </a:rPr>
+                        <a:t>Files</a:t>
+                      </a:r>
+                      <a:endParaRPr lang="en-US" dirty="0">
+                        <a:solidFill>
+                          <a:schemeClr val="bg1"/>
+                        </a:solidFill>
+                      </a:endParaRPr>
+                    </a:p>
+                  </a:txBody>
+                  <a:tcPr/>
+                </a:tc>
+                <a:tc>
+                  <a:txBody>
+                    <a:bodyPr/>
+                    <a:lstStyle/>
+                    <a:p>
+                      <a:r>
+                        <a:rPr lang="en-US" dirty="0" smtClean="0">
+                          <a:solidFill>
+                            <a:schemeClr val="bg1"/>
+                          </a:solidFill>
+                        </a:rPr>
+                        <a:t>D</a:t>
+                      </a:r>
+                      <a:r>
+                        <a:rPr lang="en-US" baseline="0" dirty="0" smtClean="0">
+                          <a:solidFill>
+                            <a:schemeClr val="bg1"/>
+                          </a:solidFill>
+                        </a:rPr>
+                        <a:t>irectories</a:t>
+                      </a:r>
+                      <a:endParaRPr lang="en-US" dirty="0">
+                        <a:solidFill>
+                          <a:schemeClr val="bg1"/>
+                        </a:solidFill>
+                      </a:endParaRPr>
+                    </a:p>
+                  </a:txBody>
+                  <a:tcPr/>
+                </a:tc>
+                <a:tc>
+                  <a:txBody>
+                    <a:bodyPr/>
+                    <a:lstStyle/>
+                    <a:p>
+                      <a:r>
+                        <a:rPr lang="en-US" dirty="0" smtClean="0">
+                          <a:solidFill>
+                            <a:schemeClr val="bg1"/>
+                          </a:solidFill>
+                        </a:rPr>
+                        <a:t>Functions</a:t>
+                      </a:r>
+                      <a:endParaRPr lang="en-US" dirty="0">
+                        <a:solidFill>
+                          <a:schemeClr val="bg1"/>
+                        </a:solidFill>
+                      </a:endParaRPr>
+                    </a:p>
+                  </a:txBody>
+                  <a:tcPr/>
+                </a:tc>
+                <a:tc>
+                  <a:txBody>
+                    <a:bodyPr/>
+                    <a:lstStyle/>
+                    <a:p>
+                      <a:r>
+                        <a:rPr lang="en-US" dirty="0" smtClean="0">
+                          <a:solidFill>
+                            <a:schemeClr val="bg1"/>
+                          </a:solidFill>
+                        </a:rPr>
+                        <a:t>Statements</a:t>
+                      </a:r>
+                      <a:endParaRPr lang="en-US" dirty="0">
+                        <a:solidFill>
+                          <a:schemeClr val="bg1"/>
+                        </a:solidFill>
+                      </a:endParaRPr>
+                    </a:p>
+                  </a:txBody>
+                  <a:tcPr/>
+                </a:tc>
+                <a:tc>
+                  <a:txBody>
+                    <a:bodyPr/>
+                    <a:lstStyle/>
+                    <a:p>
+                      <a:r>
+                        <a:rPr lang="en-US" dirty="0" smtClean="0">
+                          <a:solidFill>
+                            <a:schemeClr val="bg1"/>
+                          </a:solidFill>
+                        </a:rPr>
+                        <a:t>Description</a:t>
+                      </a:r>
+                      <a:endParaRPr lang="en-US" dirty="0">
+                        <a:solidFill>
+                          <a:schemeClr val="bg1"/>
+                        </a:solidFill>
+                      </a:endParaRPr>
+                    </a:p>
+                  </a:txBody>
+                  <a:tcPr/>
+                </a:tc>
+              </a:tr>
+              <a:tr h="370840">
+                <a:tc>
+                  <a:txBody>
+                    <a:bodyPr/>
+                    <a:lstStyle/>
+                    <a:p>
+                      <a:r>
+                        <a:rPr lang="en-US" dirty="0" err="1" smtClean="0"/>
+                        <a:t>Elastic</a:t>
+                      </a:r>
+                      <a:r>
+                        <a:rPr lang="en-US" baseline="0" dirty="0" err="1" smtClean="0"/>
+                        <a:t>Search</a:t>
+                      </a:r>
+                      <a:endParaRPr lang="en-US" dirty="0"/>
+                    </a:p>
+                  </a:txBody>
+                  <a:tcPr/>
+                </a:tc>
+                <a:tc>
+                  <a:txBody>
+                    <a:bodyPr/>
+                    <a:lstStyle/>
+                    <a:p>
+                      <a:pPr algn="ctr"/>
+                      <a:r>
+                        <a:rPr lang="en-US" dirty="0" smtClean="0"/>
+                        <a:t>4050</a:t>
+                      </a:r>
+                      <a:endParaRPr lang="en-US" dirty="0"/>
+                    </a:p>
+                  </a:txBody>
+                  <a:tcPr/>
+                </a:tc>
+                <a:tc>
+                  <a:txBody>
+                    <a:bodyPr/>
+                    <a:lstStyle/>
+                    <a:p>
+                      <a:pPr algn="ctr"/>
+                      <a:r>
+                        <a:rPr lang="en-US" dirty="0" smtClean="0"/>
+                        <a:t>831</a:t>
+                      </a:r>
+                      <a:endParaRPr lang="en-US" dirty="0"/>
+                    </a:p>
+                  </a:txBody>
+                  <a:tcPr/>
+                </a:tc>
+                <a:tc>
+                  <a:txBody>
+                    <a:bodyPr/>
+                    <a:lstStyle/>
+                    <a:p>
+                      <a:pPr algn="ctr"/>
+                      <a:r>
+                        <a:rPr lang="en-US" dirty="0" smtClean="0"/>
+                        <a:t>35762</a:t>
+                      </a:r>
+                      <a:endParaRPr lang="en-US" dirty="0"/>
+                    </a:p>
+                  </a:txBody>
+                  <a:tcPr/>
+                </a:tc>
+                <a:tc>
+                  <a:txBody>
+                    <a:bodyPr/>
+                    <a:lstStyle/>
+                    <a:p>
+                      <a:pPr algn="ctr"/>
+                      <a:r>
+                        <a:rPr lang="en-US" dirty="0" smtClean="0"/>
+                        <a:t>198944</a:t>
+                      </a:r>
+                      <a:endParaRPr lang="en-US" dirty="0"/>
+                    </a:p>
+                  </a:txBody>
+                  <a:tcPr/>
+                </a:tc>
+                <a:tc>
+                  <a:txBody>
+                    <a:bodyPr/>
+                    <a:lstStyle/>
+                    <a:p>
+                      <a:r>
+                        <a:rPr lang="en-US" dirty="0" smtClean="0"/>
+                        <a:t>Search</a:t>
+                      </a:r>
+                      <a:r>
+                        <a:rPr lang="en-US" baseline="0" dirty="0" smtClean="0"/>
+                        <a:t> server based written in Java</a:t>
+                      </a:r>
+                      <a:endParaRPr lang="en-US" dirty="0"/>
+                    </a:p>
+                  </a:txBody>
+                  <a:tcPr/>
+                </a:tc>
+              </a:tr>
+              <a:tr h="370840">
+                <a:tc>
+                  <a:txBody>
+                    <a:bodyPr/>
+                    <a:lstStyle/>
+                    <a:p>
+                      <a:r>
+                        <a:rPr lang="en-US" dirty="0" smtClean="0"/>
+                        <a:t>Guava</a:t>
+                      </a:r>
+                      <a:endParaRPr lang="en-US" dirty="0"/>
+                    </a:p>
+                  </a:txBody>
+                  <a:tcPr/>
+                </a:tc>
+                <a:tc>
+                  <a:txBody>
+                    <a:bodyPr/>
+                    <a:lstStyle/>
+                    <a:p>
+                      <a:pPr algn="ctr"/>
+                      <a:r>
+                        <a:rPr lang="en-US" dirty="0" smtClean="0"/>
+                        <a:t>799</a:t>
+                      </a:r>
+                      <a:endParaRPr lang="en-US" dirty="0"/>
+                    </a:p>
+                  </a:txBody>
+                  <a:tcPr/>
+                </a:tc>
+                <a:tc>
+                  <a:txBody>
+                    <a:bodyPr/>
+                    <a:lstStyle/>
+                    <a:p>
+                      <a:pPr algn="ctr"/>
+                      <a:r>
+                        <a:rPr lang="en-US" dirty="0" smtClean="0"/>
+                        <a:t>28</a:t>
+                      </a:r>
+                      <a:endParaRPr lang="en-US" dirty="0"/>
+                    </a:p>
+                  </a:txBody>
+                  <a:tcPr/>
+                </a:tc>
+                <a:tc>
+                  <a:txBody>
+                    <a:bodyPr/>
+                    <a:lstStyle/>
+                    <a:p>
+                      <a:pPr algn="ctr"/>
+                      <a:r>
+                        <a:rPr lang="en-US" dirty="0" smtClean="0"/>
+                        <a:t>11769</a:t>
+                      </a:r>
+                      <a:endParaRPr lang="en-US" dirty="0"/>
+                    </a:p>
+                  </a:txBody>
+                  <a:tcPr/>
+                </a:tc>
+                <a:tc>
+                  <a:txBody>
+                    <a:bodyPr/>
+                    <a:lstStyle/>
+                    <a:p>
+                      <a:pPr algn="ctr"/>
+                      <a:r>
+                        <a:rPr lang="en-US" dirty="0" smtClean="0"/>
+                        <a:t>32698</a:t>
+                      </a:r>
+                      <a:endParaRPr lang="en-US" dirty="0"/>
+                    </a:p>
+                  </a:txBody>
+                  <a:tcPr/>
+                </a:tc>
+                <a:tc>
+                  <a:txBody>
+                    <a:bodyPr/>
+                    <a:lstStyle/>
+                    <a:p>
+                      <a:r>
+                        <a:rPr lang="en-US" dirty="0" smtClean="0"/>
+                        <a:t>Set of common libraries</a:t>
+                      </a:r>
+                      <a:r>
+                        <a:rPr lang="en-US" baseline="0" dirty="0" smtClean="0"/>
+                        <a:t> for Java </a:t>
+                      </a:r>
+                      <a:endParaRPr lang="en-US" dirty="0"/>
+                    </a:p>
+                  </a:txBody>
+                  <a:tcPr/>
+                </a:tc>
+              </a:tr>
+              <a:tr h="370840">
+                <a:tc>
+                  <a:txBody>
+                    <a:bodyPr/>
+                    <a:lstStyle/>
+                    <a:p>
+                      <a:r>
+                        <a:rPr lang="en-US" dirty="0" err="1" smtClean="0"/>
+                        <a:t>JodaTime</a:t>
+                      </a:r>
+                      <a:endParaRPr lang="en-US" dirty="0"/>
+                    </a:p>
+                  </a:txBody>
+                  <a:tcPr/>
+                </a:tc>
+                <a:tc>
+                  <a:txBody>
+                    <a:bodyPr/>
+                    <a:lstStyle/>
+                    <a:p>
+                      <a:pPr algn="ctr"/>
+                      <a:r>
+                        <a:rPr lang="en-US" dirty="0" smtClean="0"/>
+                        <a:t>327</a:t>
+                      </a:r>
+                      <a:endParaRPr lang="en-US" dirty="0"/>
+                    </a:p>
+                  </a:txBody>
+                  <a:tcPr/>
+                </a:tc>
+                <a:tc>
+                  <a:txBody>
+                    <a:bodyPr/>
+                    <a:lstStyle/>
+                    <a:p>
+                      <a:pPr algn="ctr"/>
+                      <a:r>
+                        <a:rPr lang="en-US" dirty="0" smtClean="0"/>
+                        <a:t>15</a:t>
+                      </a:r>
+                      <a:endParaRPr lang="en-US" dirty="0"/>
+                    </a:p>
+                  </a:txBody>
+                  <a:tcPr/>
+                </a:tc>
+                <a:tc>
+                  <a:txBody>
+                    <a:bodyPr/>
+                    <a:lstStyle/>
+                    <a:p>
+                      <a:pPr algn="ctr"/>
+                      <a:r>
+                        <a:rPr lang="en-US" dirty="0" smtClean="0"/>
+                        <a:t>9560</a:t>
+                      </a:r>
+                      <a:endParaRPr lang="en-US" dirty="0"/>
+                    </a:p>
+                  </a:txBody>
+                  <a:tcPr/>
+                </a:tc>
+                <a:tc>
+                  <a:txBody>
+                    <a:bodyPr/>
+                    <a:lstStyle/>
+                    <a:p>
+                      <a:pPr algn="ctr"/>
+                      <a:r>
+                        <a:rPr lang="en-US" dirty="0" smtClean="0"/>
+                        <a:t>50609</a:t>
+                      </a:r>
+                      <a:endParaRPr lang="en-US" dirty="0"/>
+                    </a:p>
+                  </a:txBody>
+                  <a:tcPr/>
+                </a:tc>
+                <a:tc>
+                  <a:txBody>
+                    <a:bodyPr/>
+                    <a:lstStyle/>
+                    <a:p>
+                      <a:r>
+                        <a:rPr lang="en-US" dirty="0" smtClean="0"/>
+                        <a:t>Time and date java library</a:t>
+                      </a:r>
+                      <a:endParaRPr lang="en-US" dirty="0"/>
+                    </a:p>
+                  </a:txBody>
+                  <a:tcPr/>
+                </a:tc>
+              </a:tr>
+              <a:tr h="370840">
+                <a:tc>
+                  <a:txBody>
+                    <a:bodyPr/>
+                    <a:lstStyle/>
+                    <a:p>
+                      <a:r>
+                        <a:rPr lang="en-US" dirty="0" err="1" smtClean="0"/>
+                        <a:t>Jsoup</a:t>
+                      </a:r>
+                      <a:endParaRPr lang="en-US" dirty="0"/>
+                    </a:p>
+                  </a:txBody>
+                  <a:tcPr/>
+                </a:tc>
+                <a:tc>
+                  <a:txBody>
+                    <a:bodyPr/>
+                    <a:lstStyle/>
+                    <a:p>
+                      <a:pPr algn="ctr"/>
+                      <a:r>
+                        <a:rPr lang="en-US" dirty="0" smtClean="0"/>
+                        <a:t>80</a:t>
+                      </a:r>
+                      <a:endParaRPr lang="en-US" dirty="0"/>
+                    </a:p>
+                  </a:txBody>
+                  <a:tcPr/>
+                </a:tc>
+                <a:tc>
+                  <a:txBody>
+                    <a:bodyPr/>
+                    <a:lstStyle/>
+                    <a:p>
+                      <a:pPr algn="ctr"/>
+                      <a:r>
+                        <a:rPr lang="en-US" dirty="0" smtClean="0"/>
+                        <a:t>14</a:t>
+                      </a:r>
+                      <a:endParaRPr lang="en-US" dirty="0"/>
+                    </a:p>
+                  </a:txBody>
+                  <a:tcPr/>
+                </a:tc>
+                <a:tc>
+                  <a:txBody>
+                    <a:bodyPr/>
+                    <a:lstStyle/>
+                    <a:p>
+                      <a:pPr algn="ctr"/>
+                      <a:r>
+                        <a:rPr lang="en-US" dirty="0" smtClean="0"/>
+                        <a:t>1487</a:t>
+                      </a:r>
+                      <a:endParaRPr lang="en-US" dirty="0"/>
+                    </a:p>
+                  </a:txBody>
+                  <a:tcPr/>
+                </a:tc>
+                <a:tc>
+                  <a:txBody>
+                    <a:bodyPr/>
+                    <a:lstStyle/>
+                    <a:p>
+                      <a:pPr algn="ctr"/>
+                      <a:r>
+                        <a:rPr lang="en-US" dirty="0" smtClean="0"/>
+                        <a:t>7980</a:t>
+                      </a:r>
+                      <a:endParaRPr lang="en-US" dirty="0"/>
+                    </a:p>
+                  </a:txBody>
+                  <a:tcPr/>
+                </a:tc>
+                <a:tc>
+                  <a:txBody>
+                    <a:bodyPr/>
+                    <a:lstStyle/>
+                    <a:p>
+                      <a:r>
+                        <a:rPr lang="en-US" dirty="0" smtClean="0"/>
+                        <a:t>Java html</a:t>
+                      </a:r>
+                      <a:r>
+                        <a:rPr lang="en-US" baseline="0" dirty="0" smtClean="0"/>
+                        <a:t> parser</a:t>
+                      </a:r>
+                      <a:endParaRPr lang="en-US" dirty="0"/>
+                    </a:p>
+                  </a:txBody>
+                  <a:tcPr/>
+                </a:tc>
+              </a:tr>
+              <a:tr h="370840">
+                <a:tc>
+                  <a:txBody>
+                    <a:bodyPr/>
+                    <a:lstStyle/>
+                    <a:p>
+                      <a:r>
+                        <a:rPr lang="en-US" dirty="0" err="1" smtClean="0"/>
+                        <a:t>Junit</a:t>
+                      </a:r>
+                      <a:endParaRPr lang="en-US" dirty="0"/>
+                    </a:p>
+                  </a:txBody>
+                  <a:tcPr/>
+                </a:tc>
+                <a:tc>
+                  <a:txBody>
+                    <a:bodyPr/>
+                    <a:lstStyle/>
+                    <a:p>
+                      <a:pPr algn="ctr"/>
+                      <a:r>
+                        <a:rPr lang="en-US" dirty="0" smtClean="0"/>
+                        <a:t>392</a:t>
+                      </a:r>
+                      <a:endParaRPr lang="en-US" dirty="0"/>
+                    </a:p>
+                  </a:txBody>
+                  <a:tcPr/>
+                </a:tc>
+                <a:tc>
+                  <a:txBody>
+                    <a:bodyPr/>
+                    <a:lstStyle/>
+                    <a:p>
+                      <a:pPr algn="ctr"/>
+                      <a:r>
+                        <a:rPr lang="en-US" dirty="0" smtClean="0"/>
+                        <a:t>73</a:t>
+                      </a:r>
+                      <a:endParaRPr lang="en-US" dirty="0"/>
+                    </a:p>
+                  </a:txBody>
+                  <a:tcPr/>
+                </a:tc>
+                <a:tc>
+                  <a:txBody>
+                    <a:bodyPr/>
+                    <a:lstStyle/>
+                    <a:p>
+                      <a:pPr algn="ctr"/>
+                      <a:r>
+                        <a:rPr lang="en-US" dirty="0" smtClean="0"/>
+                        <a:t>3479</a:t>
+                      </a:r>
+                      <a:endParaRPr lang="en-US" dirty="0"/>
+                    </a:p>
+                  </a:txBody>
+                  <a:tcPr/>
+                </a:tc>
+                <a:tc>
+                  <a:txBody>
+                    <a:bodyPr/>
+                    <a:lstStyle/>
+                    <a:p>
+                      <a:pPr algn="ctr"/>
+                      <a:r>
+                        <a:rPr lang="en-US" dirty="0" smtClean="0"/>
+                        <a:t>7972</a:t>
+                      </a:r>
+                      <a:endParaRPr lang="en-US" dirty="0"/>
+                    </a:p>
+                  </a:txBody>
+                  <a:tcPr/>
+                </a:tc>
+                <a:tc>
+                  <a:txBody>
+                    <a:bodyPr/>
+                    <a:lstStyle/>
+                    <a:p>
+                      <a:r>
+                        <a:rPr lang="en-US" dirty="0" smtClean="0"/>
+                        <a:t>Unit</a:t>
+                      </a:r>
+                      <a:r>
+                        <a:rPr lang="en-US" baseline="0" dirty="0" smtClean="0"/>
+                        <a:t> test framework</a:t>
+                      </a:r>
+                      <a:endParaRPr lang="en-US" dirty="0"/>
+                    </a:p>
+                  </a:txBody>
+                  <a:tcPr/>
+                </a:tc>
+              </a:tr>
+            </a:tbl>
+          </a:graphicData>
+        </a:graphic>
+      </p:graphicFrame>
     </p:spTree>
   </p:cSld>
   <p:clrMapOvr>
@@ -5186,7 +6301,7 @@
         <p:spPr>
           <a:xfrm>
             <a:off x="213360" y="1468120"/>
-            <a:ext cx="12588240" cy="4366029"/>
+            <a:ext cx="12588240" cy="5073915"/>
           </a:xfrm>
           <a:prstGeom prst="rect">
             <a:avLst/>
@@ -5204,12 +6319,26 @@
           <a:p>
             <a:r>
               <a:rPr lang="en-CA" sz="4600" b="1" dirty="0" smtClean="0"/>
-              <a:t>RQ2 - How </a:t>
+              <a:t>RQ1 - How JavaScript </a:t>
             </a:r>
             <a:r>
               <a:rPr lang="en-CA" sz="4600" b="1" dirty="0"/>
-              <a:t>Technical Debt can influence the change proneness of the source code in the project ?</a:t>
-            </a:r>
+              <a:t>language projects evolve in </a:t>
+            </a:r>
+            <a:r>
+              <a:rPr lang="en-CA" sz="4600" b="1" dirty="0" smtClean="0"/>
+              <a:t>comparison </a:t>
+            </a:r>
+            <a:r>
+              <a:rPr lang="en-CA" sz="4600" b="1" dirty="0"/>
+              <a:t>with projects written in </a:t>
+            </a:r>
+            <a:r>
+              <a:rPr lang="en-CA" sz="4600" b="1" dirty="0" smtClean="0"/>
+              <a:t>compiled languages?</a:t>
+            </a:r>
+          </a:p>
+          <a:p>
             <a:endParaRPr lang="en-CA" sz="4600" b="1" dirty="0" smtClean="0"/>
           </a:p>
           <a:p>
@@ -5221,11 +6350,6 @@
         </p:txBody>
       </p:sp>
     </p:spTree>
-    <p:extLst>
-      <p:ext uri="{BB962C8B-B14F-4D97-AF65-F5344CB8AC3E}">
-        <p14:creationId xmlns:p14="http://schemas.microsoft.com/office/powerpoint/2010/main" val="2496398011"/>
-      </p:ext>
-    </p:extLst>
   </p:cSld>
   <p:clrMapOvr>
     <a:masterClrMapping/>
@@ -5286,7 +6410,7 @@
                   <a:srgbClr val="FF0000"/>
                 </a:solidFill>
               </a:rPr>
-              <a:t>Research questions</a:t>
+              <a:t>Used metrics</a:t>
             </a:r>
             <a:endParaRPr lang="en-US" sz="6200" b="1" dirty="0">
               <a:solidFill>
@@ -5345,14 +6469,9 @@
             <a:endParaRPr lang="en-CA" sz="4600" b="1" dirty="0" smtClean="0"/>
           </a:p>
           <a:p>
-            <a:r>
-              <a:rPr lang="en-CA" sz="4600" b="1" dirty="0" smtClean="0"/>
-              <a:t>RQ3 </a:t>
-            </a:r>
-            <a:r>
-              <a:rPr lang="en-CA" sz="4600" b="1" dirty="0"/>
-              <a:t>- How Technical Debt can influence the bug proneness of the source code in the project ?</a:t>
-            </a:r>
+            <a:endParaRPr lang="en-CA" sz="4600" b="1" dirty="0" smtClean="0"/>
+          </a:p>
+          <a:p>
             <a:endParaRPr lang="en-CA" sz="4600" b="1" dirty="0" smtClean="0"/>
           </a:p>
           <a:p>
@@ -5363,7 +6482,7 @@
     </p:spTree>
     <p:extLst>
       <p:ext uri="{BB962C8B-B14F-4D97-AF65-F5344CB8AC3E}">
-        <p14:creationId xmlns:p14="http://schemas.microsoft.com/office/powerpoint/2010/main" val="3786026389"/>
+        <p14:creationId xmlns:p14="http://schemas.microsoft.com/office/powerpoint/2010/main" val="2544118768"/>
       </p:ext>
     </p:extLst>
   </p:cSld>
@@ -5409,33 +6528,26 @@
         </p:nvSpPr>
         <p:spPr>
           <a:xfrm>
-            <a:off x="213360" y="152400"/>
+            <a:off x="533400" y="162560"/>
             <a:ext cx="11521440" cy="1209040"/>
           </a:xfrm>
         </p:spPr>
         <p:txBody>
           <a:bodyPr>
-            <a:noAutofit/>
+            <a:normAutofit/>
           </a:bodyPr>
           <a:lstStyle/>
           <a:p>
-            <a:r>
-              <a:rPr lang="en-US" sz="5400" b="1" dirty="0">
+            <a:pPr algn="l"/>
+            <a:r>
+              <a:rPr lang="en-US" sz="6200" b="1" dirty="0" smtClean="0">
                 <a:solidFill>
                   <a:srgbClr val="FF0000"/>
                 </a:solidFill>
               </a:rPr>
-              <a:t>Case study on </a:t>
-            </a:r>
-            <a:r>
-              <a:rPr lang="en-US" sz="5400" b="1" dirty="0" smtClean="0">
-                <a:solidFill>
-                  <a:srgbClr val="FF0000"/>
-                </a:solidFill>
-              </a:rPr>
-              <a:t>ten open source projects</a:t>
-            </a:r>
-            <a:endParaRPr lang="en-US" sz="5400" b="1" dirty="0">
+              <a:t>Research questions</a:t>
+            </a:r>
+            <a:endParaRPr lang="en-US" sz="6200" b="1" dirty="0">
               <a:solidFill>
                 <a:srgbClr val="FF0000"/>
               </a:solidFill>
@@ -5463,20 +6575,20 @@
               <a:pPr/>
               <a:t>8</a:t>
             </a:fld>
-            <a:endParaRPr lang="en-US"/>
-          </a:p>
-        </p:txBody>
-      </p:sp>
-      <p:sp>
-        <p:nvSpPr>
-          <p:cNvPr id="7" name="TextBox 6"/>
+            <a:endParaRPr lang="en-US" dirty="0"/>
+          </a:p>
+        </p:txBody>
+      </p:sp>
+      <p:sp>
+        <p:nvSpPr>
+          <p:cNvPr id="8" name="TextBox 7"/>
           <p:cNvSpPr txBox="1"/>
           <p:nvPr/>
         </p:nvSpPr>
         <p:spPr>
           <a:xfrm>
-            <a:off x="3723274" y="2841985"/>
-            <a:ext cx="237424" cy="472655"/>
+            <a:off x="213360" y="1468120"/>
+            <a:ext cx="12588240" cy="4366029"/>
           </a:xfrm>
           <a:prstGeom prst="rect">
             <a:avLst/>
@@ -5484,46 +6596,38 @@
           <a:noFill/>
         </p:spPr>
         <p:txBody>
-          <a:bodyPr wrap="none" lIns="117564" tIns="58782" rIns="117564" bIns="58782" rtlCol="0">
+          <a:bodyPr wrap="square" lIns="117564" tIns="58782" rIns="117564" bIns="58782" rtlCol="0">
             <a:spAutoFit/>
           </a:bodyPr>
           <a:lstStyle/>
           <a:p>
-            <a:endParaRPr lang="en-US" dirty="0"/>
-          </a:p>
-        </p:txBody>
-      </p:sp>
-      <p:pic>
-        <p:nvPicPr>
-          <p:cNvPr id="3" name="Picture 2" descr="Screenshot 2015-02-17 16.57.04.png"/>
-          <p:cNvPicPr>
-            <a:picLocks noChangeAspect="1"/>
-          </p:cNvPicPr>
-          <p:nvPr/>
-        </p:nvPicPr>
-        <p:blipFill>
-          <a:blip r:embed="rId2">
-            <a:extLst>
-              <a:ext uri="{28A0092B-C50C-407E-A947-70E740481C1C}">
-                <a14:useLocalDpi xmlns:a14="http://schemas.microsoft.com/office/drawing/2010/main" val="0"/>
-              </a:ext>
-            </a:extLst>
-          </a:blip>
-          <a:stretch>
-            <a:fillRect/>
-          </a:stretch>
-        </p:blipFill>
-        <p:spPr>
-          <a:xfrm>
-            <a:off x="0" y="1905000"/>
-            <a:ext cx="12694920" cy="5181600"/>
-          </a:xfrm>
-          <a:prstGeom prst="rect">
-            <a:avLst/>
-          </a:prstGeom>
-        </p:spPr>
-      </p:pic>
+            <a:endParaRPr lang="en-CA" sz="4600" b="1" dirty="0" smtClean="0"/>
+          </a:p>
+          <a:p>
+            <a:r>
+              <a:rPr lang="en-CA" sz="4600" b="1" dirty="0" smtClean="0"/>
+              <a:t>RQ2 - How </a:t>
+            </a:r>
+            <a:r>
+              <a:rPr lang="en-CA" sz="4600" b="1" dirty="0"/>
+              <a:t>Technical Debt can influence the change proneness of the source code in the project ?</a:t>
+            </a:r>
+            <a:endParaRPr lang="en-CA" sz="4600" b="1" dirty="0" smtClean="0"/>
+          </a:p>
+          <a:p>
+            <a:endParaRPr lang="en-CA" sz="4600" b="1" dirty="0" smtClean="0"/>
+          </a:p>
+          <a:p>
+            <a:endParaRPr lang="en-CA" sz="4600" b="1" dirty="0"/>
+          </a:p>
+        </p:txBody>
+      </p:sp>
     </p:spTree>
+    <p:extLst>
+      <p:ext uri="{BB962C8B-B14F-4D97-AF65-F5344CB8AC3E}">
+        <p14:creationId xmlns:p14="http://schemas.microsoft.com/office/powerpoint/2010/main" val="2496398011"/>
+      </p:ext>
+    </p:extLst>
   </p:cSld>
   <p:clrMapOvr>
     <a:masterClrMapping/>
@@ -5567,13 +6671,13 @@
         </p:nvSpPr>
         <p:spPr>
           <a:xfrm>
-            <a:off x="365760" y="152400"/>
+            <a:off x="533400" y="162560"/>
             <a:ext cx="11521440" cy="1209040"/>
           </a:xfrm>
         </p:spPr>
         <p:txBody>
           <a:bodyPr>
-            <a:normAutofit fontScale="90000"/>
+            <a:normAutofit/>
           </a:bodyPr>
           <a:lstStyle/>
           <a:p>
@@ -5584,7 +6688,7 @@
                   <a:srgbClr val="FF0000"/>
                 </a:solidFill>
               </a:rPr>
-              <a:t>Comments found using our approach</a:t>
+              <a:t>Research questions</a:t>
             </a:r>
             <a:endParaRPr lang="en-US" sz="6200" b="1" dirty="0">
               <a:solidFill>
@@ -5614,44 +6718,71 @@
               <a:pPr/>
               <a:t>9</a:t>
             </a:fld>
-            <a:endParaRPr lang="en-US"/>
-          </a:p>
-        </p:txBody>
-      </p:sp>
-      <p:pic>
-        <p:nvPicPr>
-          <p:cNvPr id="6" name="Picture 5" descr="Screenshot 2015-02-17 17.31.06.png"/>
-          <p:cNvPicPr>
-            <a:picLocks noChangeAspect="1"/>
-          </p:cNvPicPr>
+            <a:endParaRPr lang="en-US" dirty="0"/>
+          </a:p>
+        </p:txBody>
+      </p:sp>
+      <p:sp>
+        <p:nvSpPr>
+          <p:cNvPr id="8" name="TextBox 7"/>
+          <p:cNvSpPr txBox="1"/>
           <p:nvPr/>
-        </p:nvPicPr>
-        <p:blipFill>
-          <a:blip r:embed="rId2">
-            <a:extLst>
-              <a:ext uri="{28A0092B-C50C-407E-A947-70E740481C1C}">
-                <a14:useLocalDpi xmlns:a14="http://schemas.microsoft.com/office/drawing/2010/main" val="0"/>
-              </a:ext>
-            </a:extLst>
-          </a:blip>
-          <a:stretch>
-            <a:fillRect/>
-          </a:stretch>
-        </p:blipFill>
+        </p:nvSpPr>
         <p:spPr>
           <a:xfrm>
-            <a:off x="0" y="1917617"/>
-            <a:ext cx="12801600" cy="5245183"/>
+            <a:off x="213360" y="1468120"/>
+            <a:ext cx="12588240" cy="5073915"/>
           </a:xfrm>
           <a:prstGeom prst="rect">
             <a:avLst/>
           </a:prstGeom>
+          <a:noFill/>
         </p:spPr>
-      </p:pic>
+        <p:txBody>
+          <a:bodyPr wrap="square" lIns="117564" tIns="58782" rIns="117564" bIns="58782" rtlCol="0">
+            <a:spAutoFit/>
+          </a:bodyPr>
+          <a:lstStyle/>
+          <a:p>
+            <a:endParaRPr lang="en-CA" sz="4600" b="1" dirty="0" smtClean="0"/>
+          </a:p>
+          <a:p>
+            <a:r>
+              <a:rPr lang="en-CA" sz="4600" b="1" dirty="0" smtClean="0"/>
+              <a:t>RQ1 - How JavaScript </a:t>
+            </a:r>
+            <a:r>
+              <a:rPr lang="en-CA" sz="4600" b="1" dirty="0"/>
+              <a:t>language projects evolve in </a:t>
+            </a:r>
+            <a:r>
+              <a:rPr lang="en-CA" sz="4600" b="1" dirty="0" smtClean="0"/>
+              <a:t>comparison </a:t>
+            </a:r>
+            <a:r>
+              <a:rPr lang="en-CA" sz="4600" b="1" dirty="0"/>
+              <a:t>with projects written in </a:t>
+            </a:r>
+            <a:r>
+              <a:rPr lang="en-CA" sz="4600" b="1" dirty="0" smtClean="0"/>
+              <a:t>compiled languages?</a:t>
+            </a:r>
+          </a:p>
+          <a:p>
+            <a:endParaRPr lang="en-CA" sz="4600" b="1" dirty="0" smtClean="0"/>
+          </a:p>
+          <a:p>
+            <a:endParaRPr lang="en-CA" sz="4600" b="1" dirty="0" smtClean="0"/>
+          </a:p>
+          <a:p>
+            <a:endParaRPr lang="en-CA" sz="4600" b="1" dirty="0"/>
+          </a:p>
+        </p:txBody>
+      </p:sp>
     </p:spTree>
     <p:extLst>
       <p:ext uri="{BB962C8B-B14F-4D97-AF65-F5344CB8AC3E}">
-        <p14:creationId xmlns:p14="http://schemas.microsoft.com/office/powerpoint/2010/main" val="2529443736"/>
+        <p14:creationId xmlns:p14="http://schemas.microsoft.com/office/powerpoint/2010/main" val="1474275991"/>
       </p:ext>
     </p:extLst>
   </p:cSld>

</xml_diff>

<commit_message>
finished used metrics slides, finished  mining github repositories slide
</commit_message>
<xml_diff>
--- a/presentation.pptx
+++ b/presentation.pptx
@@ -204,7 +204,7 @@
             <a:fld id="{A3A83680-2C14-4C76-A81E-024FE6567D95}" type="datetimeFigureOut">
               <a:rPr lang="en-US" smtClean="0"/>
               <a:pPr/>
-              <a:t>3/2/15</a:t>
+              <a:t>15-03-02</a:t>
             </a:fld>
             <a:endParaRPr lang="en-US"/>
           </a:p>
@@ -948,7 +948,7 @@
             <a:fld id="{B04B26F6-2EC0-48CC-9564-7C3151355A53}" type="datetime1">
               <a:rPr lang="en-US" smtClean="0"/>
               <a:pPr/>
-              <a:t>3/2/15</a:t>
+              <a:t>15-03-02</a:t>
             </a:fld>
             <a:endParaRPr lang="en-US"/>
           </a:p>
@@ -1115,7 +1115,7 @@
             <a:fld id="{46AE693F-1EDB-4E9B-A372-75EBAC486C4C}" type="datetime1">
               <a:rPr lang="en-US" smtClean="0"/>
               <a:pPr/>
-              <a:t>3/2/15</a:t>
+              <a:t>15-03-02</a:t>
             </a:fld>
             <a:endParaRPr lang="en-US"/>
           </a:p>
@@ -1292,7 +1292,7 @@
             <a:fld id="{D7707EE7-8B9F-4F64-AB41-F607E71FAD9D}" type="datetime1">
               <a:rPr lang="en-US" smtClean="0"/>
               <a:pPr/>
-              <a:t>3/2/15</a:t>
+              <a:t>15-03-02</a:t>
             </a:fld>
             <a:endParaRPr lang="en-US"/>
           </a:p>
@@ -1459,7 +1459,7 @@
             <a:fld id="{24B568E6-F02F-4640-8CA7-DD2B1CDAF58B}" type="datetime1">
               <a:rPr lang="en-US" smtClean="0"/>
               <a:pPr/>
-              <a:t>3/2/15</a:t>
+              <a:t>15-03-02</a:t>
             </a:fld>
             <a:endParaRPr lang="en-US"/>
           </a:p>
@@ -1702,7 +1702,7 @@
             <a:fld id="{A121E7AB-71A9-4F53-B5E9-C40E8AF6F07E}" type="datetime1">
               <a:rPr lang="en-US" smtClean="0"/>
               <a:pPr/>
-              <a:t>3/2/15</a:t>
+              <a:t>15-03-02</a:t>
             </a:fld>
             <a:endParaRPr lang="en-US"/>
           </a:p>
@@ -1987,7 +1987,7 @@
             <a:fld id="{ED0EEFA4-16F8-44A0-A455-D75FA9676508}" type="datetime1">
               <a:rPr lang="en-US" smtClean="0"/>
               <a:pPr/>
-              <a:t>3/2/15</a:t>
+              <a:t>15-03-02</a:t>
             </a:fld>
             <a:endParaRPr lang="en-US"/>
           </a:p>
@@ -2406,7 +2406,7 @@
             <a:fld id="{7309DE74-458B-4027-A1B9-A0A919D2E759}" type="datetime1">
               <a:rPr lang="en-US" smtClean="0"/>
               <a:pPr/>
-              <a:t>3/2/15</a:t>
+              <a:t>15-03-02</a:t>
             </a:fld>
             <a:endParaRPr lang="en-US"/>
           </a:p>
@@ -2521,7 +2521,7 @@
             <a:fld id="{4997B861-8699-46EF-A281-77869D1CCC62}" type="datetime1">
               <a:rPr lang="en-US" smtClean="0"/>
               <a:pPr/>
-              <a:t>3/2/15</a:t>
+              <a:t>15-03-02</a:t>
             </a:fld>
             <a:endParaRPr lang="en-US"/>
           </a:p>
@@ -2613,7 +2613,7 @@
             <a:fld id="{D45435D9-7F9E-470D-B40F-9ECF253826E2}" type="datetime1">
               <a:rPr lang="en-US" smtClean="0"/>
               <a:pPr/>
-              <a:t>3/2/15</a:t>
+              <a:t>15-03-02</a:t>
             </a:fld>
             <a:endParaRPr lang="en-US"/>
           </a:p>
@@ -2887,7 +2887,7 @@
             <a:fld id="{BCF807F3-50E1-49A6-9810-311E7547B47D}" type="datetime1">
               <a:rPr lang="en-US" smtClean="0"/>
               <a:pPr/>
-              <a:t>3/2/15</a:t>
+              <a:t>15-03-02</a:t>
             </a:fld>
             <a:endParaRPr lang="en-US"/>
           </a:p>
@@ -3137,7 +3137,7 @@
             <a:fld id="{3241E4AC-654B-44E5-8A53-D925CD7B043C}" type="datetime1">
               <a:rPr lang="en-US" smtClean="0"/>
               <a:pPr/>
-              <a:t>3/2/15</a:t>
+              <a:t>15-03-02</a:t>
             </a:fld>
             <a:endParaRPr lang="en-US"/>
           </a:p>
@@ -3347,7 +3347,7 @@
             <a:fld id="{E1ED303D-2AF7-4EBB-943A-20D78C0D5FED}" type="datetime1">
               <a:rPr lang="en-US" smtClean="0"/>
               <a:pPr/>
-              <a:t>3/2/15</a:t>
+              <a:t>15-03-02</a:t>
             </a:fld>
             <a:endParaRPr lang="en-US"/>
           </a:p>
@@ -4261,6 +4261,148 @@
           </a:p>
         </p:txBody>
       </p:sp>
+      <p:sp>
+        <p:nvSpPr>
+          <p:cNvPr id="6" name="TextBox 5"/>
+          <p:cNvSpPr txBox="1"/>
+          <p:nvPr/>
+        </p:nvSpPr>
+        <p:spPr>
+          <a:xfrm>
+            <a:off x="152400" y="1523219"/>
+            <a:ext cx="12588240" cy="5966468"/>
+          </a:xfrm>
+          <a:prstGeom prst="rect">
+            <a:avLst/>
+          </a:prstGeom>
+          <a:noFill/>
+        </p:spPr>
+        <p:txBody>
+          <a:bodyPr wrap="square" lIns="117564" tIns="58782" rIns="117564" bIns="58782" rtlCol="0">
+            <a:spAutoFit/>
+          </a:bodyPr>
+          <a:lstStyle/>
+          <a:p>
+            <a:r>
+              <a:rPr lang="en-CA" sz="3600" b="1" dirty="0" err="1" smtClean="0"/>
+              <a:t>Git</a:t>
+            </a:r>
+            <a:r>
+              <a:rPr lang="en-CA" sz="3600" b="1" dirty="0" err="1" smtClean="0"/>
+              <a:t>Hub</a:t>
+            </a:r>
+            <a:r>
+              <a:rPr lang="en-CA" sz="3600" b="1" dirty="0" smtClean="0"/>
+              <a:t> can be used as code and bug repositories and it provides an API to access this data. </a:t>
+            </a:r>
+          </a:p>
+          <a:p>
+            <a:endParaRPr lang="en-CA" sz="3600" b="1" dirty="0"/>
+          </a:p>
+          <a:p>
+            <a:r>
+              <a:rPr lang="en-CA" sz="3600" b="1" dirty="0" smtClean="0"/>
+              <a:t>Create a </a:t>
+            </a:r>
+            <a:r>
+              <a:rPr lang="en-CA" sz="3600" b="1" smtClean="0"/>
+              <a:t>authorization token</a:t>
+            </a:r>
+          </a:p>
+          <a:p>
+            <a:endParaRPr lang="en-CA" sz="3600" b="1" dirty="0" smtClean="0"/>
+          </a:p>
+          <a:p>
+            <a:r>
+              <a:rPr lang="en-US" sz="2800" dirty="0" smtClean="0"/>
+              <a:t>&lt;username</a:t>
+            </a:r>
+            <a:r>
+              <a:rPr lang="en-US" sz="2800" dirty="0"/>
+              <a:t>&gt; -d '{"scopes": ["repo", "</a:t>
+            </a:r>
+            <a:r>
+              <a:rPr lang="en-US" sz="2800" dirty="0" smtClean="0"/>
+              <a:t>user”]}</a:t>
+            </a:r>
+            <a:r>
+              <a:rPr lang="en-US" sz="2800" dirty="0"/>
+              <a:t>' \https://</a:t>
+            </a:r>
+            <a:r>
+              <a:rPr lang="en-US" sz="2800" dirty="0" err="1"/>
+              <a:t>api.github.com</a:t>
+            </a:r>
+            <a:r>
+              <a:rPr lang="en-US" sz="2800" dirty="0"/>
+              <a:t>/authorizations</a:t>
+            </a:r>
+            <a:endParaRPr lang="en-CA" sz="2800" b="1" dirty="0" smtClean="0"/>
+          </a:p>
+          <a:p>
+            <a:endParaRPr lang="en-CA" sz="3600" b="1" dirty="0" smtClean="0"/>
+          </a:p>
+          <a:p>
+            <a:r>
+              <a:rPr lang="en-CA" sz="3600" b="1" dirty="0" smtClean="0"/>
+              <a:t>Request all the commits</a:t>
+            </a:r>
+          </a:p>
+          <a:p>
+            <a:r>
+              <a:rPr lang="en-US" sz="2800" dirty="0" smtClean="0"/>
+              <a:t>	https</a:t>
+            </a:r>
+            <a:r>
+              <a:rPr lang="en-US" sz="2800" dirty="0"/>
+              <a:t>://api.github.com/repos/&lt;repo_owner&gt;/&lt;repo_name&gt;/commits </a:t>
+            </a:r>
+            <a:endParaRPr lang="en-CA" sz="3600" b="1" dirty="0"/>
+          </a:p>
+          <a:p>
+            <a:r>
+              <a:rPr lang="en-CA" sz="3600" b="1" dirty="0" smtClean="0"/>
+              <a:t>Request all the issues</a:t>
+            </a:r>
+            <a:endParaRPr lang="en-CA" sz="3600" b="1" dirty="0" smtClean="0"/>
+          </a:p>
+          <a:p>
+            <a:r>
+              <a:rPr lang="en-CA" sz="2800" b="1" dirty="0" smtClean="0"/>
+              <a:t>	</a:t>
+            </a:r>
+            <a:r>
+              <a:rPr lang="en-US" sz="2800" dirty="0"/>
+              <a:t>https://</a:t>
+            </a:r>
+            <a:r>
+              <a:rPr lang="en-US" sz="2800" dirty="0" err="1"/>
+              <a:t>api.github.com</a:t>
+            </a:r>
+            <a:r>
+              <a:rPr lang="en-US" sz="2800" dirty="0"/>
+              <a:t>/repos/&lt;</a:t>
+            </a:r>
+            <a:r>
+              <a:rPr lang="en-US" sz="2800" dirty="0" err="1"/>
+              <a:t>repo_owner</a:t>
+            </a:r>
+            <a:r>
+              <a:rPr lang="en-US" sz="2800" dirty="0"/>
+              <a:t>&gt;/&lt;</a:t>
+            </a:r>
+            <a:r>
+              <a:rPr lang="en-US" sz="2800" dirty="0" err="1"/>
+              <a:t>repo_name</a:t>
+            </a:r>
+            <a:r>
+              <a:rPr lang="en-US" sz="2800" dirty="0"/>
+              <a:t>&gt;/issues</a:t>
+            </a:r>
+            <a:endParaRPr lang="en-CA" sz="2800" b="1" dirty="0"/>
+          </a:p>
+        </p:txBody>
+      </p:sp>
     </p:spTree>
     <p:extLst>
       <p:ext uri="{BB962C8B-B14F-4D97-AF65-F5344CB8AC3E}">
@@ -4534,7 +4676,6 @@
               <a:rPr lang="en-CA" sz="4600" dirty="0" smtClean="0"/>
               <a:t> in comparison with Java projects. </a:t>
             </a:r>
-            <a:endParaRPr lang="en-CA" sz="4600" dirty="0" smtClean="0"/>
           </a:p>
           <a:p>
             <a:pPr algn="ctr"/>
@@ -4542,7 +4683,6 @@
               <a:rPr lang="en-CA" sz="4600" dirty="0" smtClean="0"/>
               <a:t>If we find a pattern for the evolution we can use different technique to improve the quality of JavaScript projects.</a:t>
             </a:r>
-            <a:endParaRPr lang="en-CA" sz="4600" dirty="0" smtClean="0"/>
           </a:p>
           <a:p>
             <a:pPr algn="ctr"/>
@@ -6499,8 +6639,8 @@
         </p:nvSpPr>
         <p:spPr>
           <a:xfrm>
-            <a:off x="213360" y="1468120"/>
-            <a:ext cx="12588240" cy="2950256"/>
+            <a:off x="633370" y="2133057"/>
+            <a:ext cx="11863430" cy="3658143"/>
           </a:xfrm>
           <a:prstGeom prst="rect">
             <a:avLst/>
@@ -6513,16 +6653,83 @@
           </a:bodyPr>
           <a:lstStyle/>
           <a:p>
-            <a:endParaRPr lang="en-CA" sz="4600" b="1" dirty="0" smtClean="0"/>
-          </a:p>
-          <a:p>
-            <a:endParaRPr lang="en-CA" sz="4600" b="1" dirty="0" smtClean="0"/>
-          </a:p>
-          <a:p>
-            <a:endParaRPr lang="en-CA" sz="4600" b="1" dirty="0" smtClean="0"/>
-          </a:p>
-          <a:p>
-            <a:endParaRPr lang="en-CA" sz="4600" b="1" dirty="0"/>
+            <a:pPr marL="685800" indent="-685800">
+              <a:buFont typeface="Arial"/>
+              <a:buChar char="•"/>
+            </a:pPr>
+            <a:r>
+              <a:rPr lang="en-CA" sz="4600" dirty="0"/>
+              <a:t>number of </a:t>
+            </a:r>
+            <a:r>
+              <a:rPr lang="en-CA" sz="4600" dirty="0" smtClean="0"/>
+              <a:t>files</a:t>
+            </a:r>
+          </a:p>
+          <a:p>
+            <a:pPr marL="685800" indent="-685800">
+              <a:buFont typeface="Arial"/>
+              <a:buChar char="•"/>
+            </a:pPr>
+            <a:r>
+              <a:rPr lang="en-CA" sz="4600" dirty="0" smtClean="0"/>
+              <a:t>lines </a:t>
+            </a:r>
+            <a:r>
+              <a:rPr lang="en-CA" sz="4600" dirty="0"/>
+              <a:t>of </a:t>
+            </a:r>
+            <a:r>
+              <a:rPr lang="en-CA" sz="4600" dirty="0" smtClean="0"/>
+              <a:t>code</a:t>
+            </a:r>
+          </a:p>
+          <a:p>
+            <a:pPr marL="685800" indent="-685800">
+              <a:buFont typeface="Arial"/>
+              <a:buChar char="•"/>
+            </a:pPr>
+            <a:r>
+              <a:rPr lang="en-CA" sz="4600" dirty="0" smtClean="0"/>
+              <a:t>number </a:t>
+            </a:r>
+            <a:r>
+              <a:rPr lang="en-CA" sz="4600" dirty="0"/>
+              <a:t>of functions </a:t>
+            </a:r>
+            <a:r>
+              <a:rPr lang="en-CA" sz="4600" dirty="0" smtClean="0"/>
+              <a:t>and statements</a:t>
+            </a:r>
+          </a:p>
+          <a:p>
+            <a:pPr marL="685800" indent="-685800">
+              <a:buFont typeface="Arial"/>
+              <a:buChar char="•"/>
+            </a:pPr>
+            <a:r>
+              <a:rPr lang="en-CA" sz="4600" dirty="0" smtClean="0"/>
+              <a:t>c</a:t>
+            </a:r>
+            <a:r>
+              <a:rPr lang="en-CA" sz="4600" dirty="0" smtClean="0"/>
+              <a:t>omplexity</a:t>
+            </a:r>
+          </a:p>
+          <a:p>
+            <a:pPr marL="685800" indent="-685800">
+              <a:buFont typeface="Arial"/>
+              <a:buChar char="•"/>
+            </a:pPr>
+            <a:r>
+              <a:rPr lang="en-CA" sz="4600" dirty="0"/>
+              <a:t>t</a:t>
+            </a:r>
+            <a:r>
+              <a:rPr lang="en-CA" sz="4600" dirty="0" smtClean="0"/>
+              <a:t>echnical debt</a:t>
+            </a:r>
+            <a:endParaRPr lang="en-CA" sz="4600" dirty="0"/>
           </a:p>
         </p:txBody>
       </p:sp>

</xml_diff>

<commit_message>
update the goal section
</commit_message>
<xml_diff>
--- a/presentation.pptx
+++ b/presentation.pptx
@@ -4269,8 +4269,9 @@
             <a:pPr algn="ctr"/>
             <a:r>
               <a:rPr lang="en-CA" sz="4600" dirty="0" smtClean="0"/>
-              <a:t>If we find a pattern for the evolution we can use different technique to improve the quality of JavaScript projects.</a:t>
-            </a:r>
+              <a:t>The comparison can show us how practices learnt from Java can be applied to JavaScript.</a:t>
+            </a:r>
+            <a:endParaRPr lang="en-CA" sz="4600" dirty="0" smtClean="0"/>
           </a:p>
           <a:p>
             <a:pPr algn="ctr"/>

</xml_diff>